<commit_message>
updated ppt after feedback
</commit_message>
<xml_diff>
--- a/Deliverable3/Presentation/Rock_Stars_Presentation.pptx
+++ b/Deliverable3/Presentation/Rock_Stars_Presentation.pptx
@@ -11,7 +11,7 @@
     <p:sldMasterId id="2147483669" r:id="rId7"/>
   </p:sldMasterIdLst>
   <p:notesMasterIdLst>
-    <p:notesMasterId r:id="rId27"/>
+    <p:notesMasterId r:id="rId24"/>
   </p:notesMasterIdLst>
   <p:sldIdLst>
     <p:sldId id="256" r:id="rId8"/>
@@ -20,36 +20,33 @@
     <p:sldId id="268" r:id="rId11"/>
     <p:sldId id="272" r:id="rId12"/>
     <p:sldId id="276" r:id="rId13"/>
-    <p:sldId id="289" r:id="rId14"/>
-    <p:sldId id="290" r:id="rId15"/>
-    <p:sldId id="291" r:id="rId16"/>
-    <p:sldId id="284" r:id="rId17"/>
-    <p:sldId id="286" r:id="rId18"/>
-    <p:sldId id="287" r:id="rId19"/>
-    <p:sldId id="285" r:id="rId20"/>
-    <p:sldId id="282" r:id="rId21"/>
-    <p:sldId id="261" r:id="rId22"/>
-    <p:sldId id="283" r:id="rId23"/>
-    <p:sldId id="266" r:id="rId24"/>
-    <p:sldId id="279" r:id="rId25"/>
-    <p:sldId id="278" r:id="rId26"/>
+    <p:sldId id="290" r:id="rId14"/>
+    <p:sldId id="291" r:id="rId15"/>
+    <p:sldId id="285" r:id="rId16"/>
+    <p:sldId id="292" r:id="rId17"/>
+    <p:sldId id="282" r:id="rId18"/>
+    <p:sldId id="261" r:id="rId19"/>
+    <p:sldId id="283" r:id="rId20"/>
+    <p:sldId id="266" r:id="rId21"/>
+    <p:sldId id="279" r:id="rId22"/>
+    <p:sldId id="278" r:id="rId23"/>
   </p:sldIdLst>
   <p:sldSz cx="9144000" cy="6858000" type="screen4x3"/>
   <p:notesSz cx="6858000" cy="9144000"/>
   <p:embeddedFontLst>
     <p:embeddedFont>
       <p:font typeface="Roboto" panose="020B0604020202020204" charset="0"/>
-      <p:regular r:id="rId28"/>
-      <p:bold r:id="rId29"/>
-      <p:italic r:id="rId30"/>
-      <p:boldItalic r:id="rId31"/>
+      <p:regular r:id="rId25"/>
+      <p:bold r:id="rId26"/>
+      <p:italic r:id="rId27"/>
+      <p:boldItalic r:id="rId28"/>
     </p:embeddedFont>
     <p:embeddedFont>
       <p:font typeface="Calibri" panose="020F0502020204030204" pitchFamily="34" charset="0"/>
-      <p:regular r:id="rId32"/>
-      <p:bold r:id="rId33"/>
-      <p:italic r:id="rId34"/>
-      <p:boldItalic r:id="rId35"/>
+      <p:regular r:id="rId29"/>
+      <p:bold r:id="rId30"/>
+      <p:italic r:id="rId31"/>
+      <p:boldItalic r:id="rId32"/>
     </p:embeddedFont>
   </p:embeddedFontLst>
   <p:defaultTextStyle>
@@ -734,7 +731,7 @@
     </p:spTree>
     <p:extLst>
       <p:ext uri="{BB962C8B-B14F-4D97-AF65-F5344CB8AC3E}">
-        <p14:creationId xmlns:p14="http://schemas.microsoft.com/office/powerpoint/2010/main" val="2173312332"/>
+        <p14:creationId xmlns:p14="http://schemas.microsoft.com/office/powerpoint/2010/main" val="3659753654"/>
       </p:ext>
     </p:extLst>
   </p:cSld>
@@ -745,336 +742,6 @@
 </file>
 
 <file path=ppt/notesSlides/notesSlide11.xml><?xml version="1.0" encoding="utf-8"?>
-<p:notes xmlns:a="http://schemas.openxmlformats.org/drawingml/2006/main" xmlns:r="http://schemas.openxmlformats.org/officeDocument/2006/relationships" xmlns:p="http://schemas.openxmlformats.org/presentationml/2006/main" showMasterSp="0" showMasterPhAnim="0">
-  <p:cSld>
-    <p:spTree>
-      <p:nvGrpSpPr>
-        <p:cNvPr id="1" name="Shape 128"/>
-        <p:cNvGrpSpPr/>
-        <p:nvPr/>
-      </p:nvGrpSpPr>
-      <p:grpSpPr>
-        <a:xfrm>
-          <a:off x="0" y="0"/>
-          <a:ext cx="0" cy="0"/>
-          <a:chOff x="0" y="0"/>
-          <a:chExt cx="0" cy="0"/>
-        </a:xfrm>
-      </p:grpSpPr>
-      <p:sp>
-        <p:nvSpPr>
-          <p:cNvPr id="129" name="Shape 129"/>
-          <p:cNvSpPr txBox="1">
-            <a:spLocks noGrp="1"/>
-          </p:cNvSpPr>
-          <p:nvPr>
-            <p:ph type="body" idx="1"/>
-          </p:nvPr>
-        </p:nvSpPr>
-        <p:spPr>
-          <a:xfrm>
-            <a:off x="685800" y="4343400"/>
-            <a:ext cx="5486399" cy="4114800"/>
-          </a:xfrm>
-          <a:prstGeom prst="rect">
-            <a:avLst/>
-          </a:prstGeom>
-          <a:noFill/>
-          <a:ln>
-            <a:noFill/>
-          </a:ln>
-        </p:spPr>
-        <p:txBody>
-          <a:bodyPr lIns="91425" tIns="91425" rIns="91425" bIns="91425" anchor="ctr" anchorCtr="0">
-            <a:noAutofit/>
-          </a:bodyPr>
-          <a:lstStyle/>
-          <a:p>
-            <a:pPr lvl="0">
-              <a:spcBef>
-                <a:spcPts val="0"/>
-              </a:spcBef>
-              <a:buNone/>
-            </a:pPr>
-            <a:endParaRPr dirty="0"/>
-          </a:p>
-        </p:txBody>
-      </p:sp>
-      <p:sp>
-        <p:nvSpPr>
-          <p:cNvPr id="130" name="Shape 130"/>
-          <p:cNvSpPr>
-            <a:spLocks noGrp="1" noRot="1" noChangeAspect="1"/>
-          </p:cNvSpPr>
-          <p:nvPr>
-            <p:ph type="sldImg" idx="2"/>
-          </p:nvPr>
-        </p:nvSpPr>
-        <p:spPr>
-          <a:xfrm>
-            <a:off x="1143000" y="685800"/>
-            <a:ext cx="4572000" cy="3429000"/>
-          </a:xfrm>
-          <a:custGeom>
-            <a:avLst/>
-            <a:gdLst/>
-            <a:ahLst/>
-            <a:cxnLst/>
-            <a:rect l="0" t="0" r="0" b="0"/>
-            <a:pathLst>
-              <a:path w="120000" h="120000" extrusionOk="0">
-                <a:moveTo>
-                  <a:pt x="0" y="0"/>
-                </a:moveTo>
-                <a:lnTo>
-                  <a:pt x="120000" y="0"/>
-                </a:lnTo>
-                <a:lnTo>
-                  <a:pt x="120000" y="120000"/>
-                </a:lnTo>
-                <a:lnTo>
-                  <a:pt x="0" y="120000"/>
-                </a:lnTo>
-                <a:close/>
-              </a:path>
-            </a:pathLst>
-          </a:custGeom>
-        </p:spPr>
-      </p:sp>
-    </p:spTree>
-    <p:extLst>
-      <p:ext uri="{BB962C8B-B14F-4D97-AF65-F5344CB8AC3E}">
-        <p14:creationId xmlns:p14="http://schemas.microsoft.com/office/powerpoint/2010/main" val="3420684429"/>
-      </p:ext>
-    </p:extLst>
-  </p:cSld>
-  <p:clrMapOvr>
-    <a:masterClrMapping/>
-  </p:clrMapOvr>
-</p:notes>
-</file>
-
-<file path=ppt/notesSlides/notesSlide12.xml><?xml version="1.0" encoding="utf-8"?>
-<p:notes xmlns:a="http://schemas.openxmlformats.org/drawingml/2006/main" xmlns:r="http://schemas.openxmlformats.org/officeDocument/2006/relationships" xmlns:p="http://schemas.openxmlformats.org/presentationml/2006/main" showMasterSp="0" showMasterPhAnim="0">
-  <p:cSld>
-    <p:spTree>
-      <p:nvGrpSpPr>
-        <p:cNvPr id="1" name="Shape 128"/>
-        <p:cNvGrpSpPr/>
-        <p:nvPr/>
-      </p:nvGrpSpPr>
-      <p:grpSpPr>
-        <a:xfrm>
-          <a:off x="0" y="0"/>
-          <a:ext cx="0" cy="0"/>
-          <a:chOff x="0" y="0"/>
-          <a:chExt cx="0" cy="0"/>
-        </a:xfrm>
-      </p:grpSpPr>
-      <p:sp>
-        <p:nvSpPr>
-          <p:cNvPr id="129" name="Shape 129"/>
-          <p:cNvSpPr txBox="1">
-            <a:spLocks noGrp="1"/>
-          </p:cNvSpPr>
-          <p:nvPr>
-            <p:ph type="body" idx="1"/>
-          </p:nvPr>
-        </p:nvSpPr>
-        <p:spPr>
-          <a:xfrm>
-            <a:off x="685800" y="4343400"/>
-            <a:ext cx="5486399" cy="4114800"/>
-          </a:xfrm>
-          <a:prstGeom prst="rect">
-            <a:avLst/>
-          </a:prstGeom>
-          <a:noFill/>
-          <a:ln>
-            <a:noFill/>
-          </a:ln>
-        </p:spPr>
-        <p:txBody>
-          <a:bodyPr lIns="91425" tIns="91425" rIns="91425" bIns="91425" anchor="ctr" anchorCtr="0">
-            <a:noAutofit/>
-          </a:bodyPr>
-          <a:lstStyle/>
-          <a:p>
-            <a:pPr lvl="0">
-              <a:spcBef>
-                <a:spcPts val="0"/>
-              </a:spcBef>
-              <a:buNone/>
-            </a:pPr>
-            <a:endParaRPr dirty="0"/>
-          </a:p>
-        </p:txBody>
-      </p:sp>
-      <p:sp>
-        <p:nvSpPr>
-          <p:cNvPr id="130" name="Shape 130"/>
-          <p:cNvSpPr>
-            <a:spLocks noGrp="1" noRot="1" noChangeAspect="1"/>
-          </p:cNvSpPr>
-          <p:nvPr>
-            <p:ph type="sldImg" idx="2"/>
-          </p:nvPr>
-        </p:nvSpPr>
-        <p:spPr>
-          <a:xfrm>
-            <a:off x="1143000" y="685800"/>
-            <a:ext cx="4572000" cy="3429000"/>
-          </a:xfrm>
-          <a:custGeom>
-            <a:avLst/>
-            <a:gdLst/>
-            <a:ahLst/>
-            <a:cxnLst/>
-            <a:rect l="0" t="0" r="0" b="0"/>
-            <a:pathLst>
-              <a:path w="120000" h="120000" extrusionOk="0">
-                <a:moveTo>
-                  <a:pt x="0" y="0"/>
-                </a:moveTo>
-                <a:lnTo>
-                  <a:pt x="120000" y="0"/>
-                </a:lnTo>
-                <a:lnTo>
-                  <a:pt x="120000" y="120000"/>
-                </a:lnTo>
-                <a:lnTo>
-                  <a:pt x="0" y="120000"/>
-                </a:lnTo>
-                <a:close/>
-              </a:path>
-            </a:pathLst>
-          </a:custGeom>
-        </p:spPr>
-      </p:sp>
-    </p:spTree>
-    <p:extLst>
-      <p:ext uri="{BB962C8B-B14F-4D97-AF65-F5344CB8AC3E}">
-        <p14:creationId xmlns:p14="http://schemas.microsoft.com/office/powerpoint/2010/main" val="2239454111"/>
-      </p:ext>
-    </p:extLst>
-  </p:cSld>
-  <p:clrMapOvr>
-    <a:masterClrMapping/>
-  </p:clrMapOvr>
-</p:notes>
-</file>
-
-<file path=ppt/notesSlides/notesSlide13.xml><?xml version="1.0" encoding="utf-8"?>
-<p:notes xmlns:a="http://schemas.openxmlformats.org/drawingml/2006/main" xmlns:r="http://schemas.openxmlformats.org/officeDocument/2006/relationships" xmlns:p="http://schemas.openxmlformats.org/presentationml/2006/main" showMasterSp="0" showMasterPhAnim="0">
-  <p:cSld>
-    <p:spTree>
-      <p:nvGrpSpPr>
-        <p:cNvPr id="1" name="Shape 128"/>
-        <p:cNvGrpSpPr/>
-        <p:nvPr/>
-      </p:nvGrpSpPr>
-      <p:grpSpPr>
-        <a:xfrm>
-          <a:off x="0" y="0"/>
-          <a:ext cx="0" cy="0"/>
-          <a:chOff x="0" y="0"/>
-          <a:chExt cx="0" cy="0"/>
-        </a:xfrm>
-      </p:grpSpPr>
-      <p:sp>
-        <p:nvSpPr>
-          <p:cNvPr id="129" name="Shape 129"/>
-          <p:cNvSpPr txBox="1">
-            <a:spLocks noGrp="1"/>
-          </p:cNvSpPr>
-          <p:nvPr>
-            <p:ph type="body" idx="1"/>
-          </p:nvPr>
-        </p:nvSpPr>
-        <p:spPr>
-          <a:xfrm>
-            <a:off x="685800" y="4343400"/>
-            <a:ext cx="5486399" cy="4114800"/>
-          </a:xfrm>
-          <a:prstGeom prst="rect">
-            <a:avLst/>
-          </a:prstGeom>
-          <a:noFill/>
-          <a:ln>
-            <a:noFill/>
-          </a:ln>
-        </p:spPr>
-        <p:txBody>
-          <a:bodyPr lIns="91425" tIns="91425" rIns="91425" bIns="91425" anchor="ctr" anchorCtr="0">
-            <a:noAutofit/>
-          </a:bodyPr>
-          <a:lstStyle/>
-          <a:p>
-            <a:pPr lvl="0">
-              <a:spcBef>
-                <a:spcPts val="0"/>
-              </a:spcBef>
-              <a:buNone/>
-            </a:pPr>
-            <a:endParaRPr dirty="0"/>
-          </a:p>
-        </p:txBody>
-      </p:sp>
-      <p:sp>
-        <p:nvSpPr>
-          <p:cNvPr id="130" name="Shape 130"/>
-          <p:cNvSpPr>
-            <a:spLocks noGrp="1" noRot="1" noChangeAspect="1"/>
-          </p:cNvSpPr>
-          <p:nvPr>
-            <p:ph type="sldImg" idx="2"/>
-          </p:nvPr>
-        </p:nvSpPr>
-        <p:spPr>
-          <a:xfrm>
-            <a:off x="1143000" y="685800"/>
-            <a:ext cx="4572000" cy="3429000"/>
-          </a:xfrm>
-          <a:custGeom>
-            <a:avLst/>
-            <a:gdLst/>
-            <a:ahLst/>
-            <a:cxnLst/>
-            <a:rect l="0" t="0" r="0" b="0"/>
-            <a:pathLst>
-              <a:path w="120000" h="120000" extrusionOk="0">
-                <a:moveTo>
-                  <a:pt x="0" y="0"/>
-                </a:moveTo>
-                <a:lnTo>
-                  <a:pt x="120000" y="0"/>
-                </a:lnTo>
-                <a:lnTo>
-                  <a:pt x="120000" y="120000"/>
-                </a:lnTo>
-                <a:lnTo>
-                  <a:pt x="0" y="120000"/>
-                </a:lnTo>
-                <a:close/>
-              </a:path>
-            </a:pathLst>
-          </a:custGeom>
-        </p:spPr>
-      </p:sp>
-    </p:spTree>
-    <p:extLst>
-      <p:ext uri="{BB962C8B-B14F-4D97-AF65-F5344CB8AC3E}">
-        <p14:creationId xmlns:p14="http://schemas.microsoft.com/office/powerpoint/2010/main" val="2237893342"/>
-      </p:ext>
-    </p:extLst>
-  </p:cSld>
-  <p:clrMapOvr>
-    <a:masterClrMapping/>
-  </p:clrMapOvr>
-</p:notes>
-</file>
-
-<file path=ppt/notesSlides/notesSlide14.xml><?xml version="1.0" encoding="utf-8"?>
 <p:notes xmlns:a="http://schemas.openxmlformats.org/drawingml/2006/main" xmlns:r="http://schemas.openxmlformats.org/officeDocument/2006/relationships" xmlns:p="http://schemas.openxmlformats.org/presentationml/2006/main" showMasterSp="0" showMasterPhAnim="0">
   <p:cSld>
     <p:spTree>
@@ -1184,7 +851,7 @@
 </p:notes>
 </file>
 
-<file path=ppt/notesSlides/notesSlide15.xml><?xml version="1.0" encoding="utf-8"?>
+<file path=ppt/notesSlides/notesSlide12.xml><?xml version="1.0" encoding="utf-8"?>
 <p:notes xmlns:a="http://schemas.openxmlformats.org/drawingml/2006/main" xmlns:r="http://schemas.openxmlformats.org/officeDocument/2006/relationships" xmlns:p="http://schemas.openxmlformats.org/presentationml/2006/main" showMasterSp="0" showMasterPhAnim="0">
   <p:cSld>
     <p:spTree>
@@ -1294,7 +961,7 @@
 </p:notes>
 </file>
 
-<file path=ppt/notesSlides/notesSlide16.xml><?xml version="1.0" encoding="utf-8"?>
+<file path=ppt/notesSlides/notesSlide13.xml><?xml version="1.0" encoding="utf-8"?>
 <p:notes xmlns:a="http://schemas.openxmlformats.org/drawingml/2006/main" xmlns:r="http://schemas.openxmlformats.org/officeDocument/2006/relationships" xmlns:p="http://schemas.openxmlformats.org/presentationml/2006/main" showMasterSp="0" showMasterPhAnim="0">
   <p:cSld>
     <p:spTree>
@@ -1404,7 +1071,7 @@
 </p:notes>
 </file>
 
-<file path=ppt/notesSlides/notesSlide17.xml><?xml version="1.0" encoding="utf-8"?>
+<file path=ppt/notesSlides/notesSlide14.xml><?xml version="1.0" encoding="utf-8"?>
 <p:notes xmlns:a="http://schemas.openxmlformats.org/drawingml/2006/main" xmlns:r="http://schemas.openxmlformats.org/officeDocument/2006/relationships" xmlns:p="http://schemas.openxmlformats.org/presentationml/2006/main" showMasterSp="0" showMasterPhAnim="0">
   <p:cSld>
     <p:spTree>
@@ -2164,7 +1831,7 @@
     </p:spTree>
     <p:extLst>
       <p:ext uri="{BB962C8B-B14F-4D97-AF65-F5344CB8AC3E}">
-        <p14:creationId xmlns:p14="http://schemas.microsoft.com/office/powerpoint/2010/main" val="431184604"/>
+        <p14:creationId xmlns:p14="http://schemas.microsoft.com/office/powerpoint/2010/main" val="2290420978"/>
       </p:ext>
     </p:extLst>
   </p:cSld>
@@ -2274,7 +1941,7 @@
     </p:spTree>
     <p:extLst>
       <p:ext uri="{BB962C8B-B14F-4D97-AF65-F5344CB8AC3E}">
-        <p14:creationId xmlns:p14="http://schemas.microsoft.com/office/powerpoint/2010/main" val="2290420978"/>
+        <p14:creationId xmlns:p14="http://schemas.microsoft.com/office/powerpoint/2010/main" val="1885447851"/>
       </p:ext>
     </p:extLst>
   </p:cSld>
@@ -2384,7 +2051,7 @@
     </p:spTree>
     <p:extLst>
       <p:ext uri="{BB962C8B-B14F-4D97-AF65-F5344CB8AC3E}">
-        <p14:creationId xmlns:p14="http://schemas.microsoft.com/office/powerpoint/2010/main" val="1885447851"/>
+        <p14:creationId xmlns:p14="http://schemas.microsoft.com/office/powerpoint/2010/main" val="2237893342"/>
       </p:ext>
     </p:extLst>
   </p:cSld>
@@ -18954,18 +18621,6 @@
               </a:rPr>
               <a:t>TRAVELS </a:t>
             </a:r>
-            <a:r>
-              <a:rPr lang="en-US" sz="4400" b="1" i="0" u="none" strike="noStrike" cap="none" dirty="0" smtClean="0">
-                <a:solidFill>
-                  <a:schemeClr val="lt1"/>
-                </a:solidFill>
-                <a:latin typeface="Calibri"/>
-                <a:ea typeface="Calibri"/>
-                <a:cs typeface="Calibri"/>
-                <a:sym typeface="Calibri"/>
-              </a:rPr>
-              <a:t/>
-            </a:r>
             <a:br>
               <a:rPr lang="en-US" sz="4400" b="1" i="0" u="none" strike="noStrike" cap="none" dirty="0" smtClean="0">
                 <a:solidFill>
@@ -19230,185 +18885,104 @@
           </a:bodyPr>
           <a:lstStyle/>
           <a:p>
-            <a:pPr lvl="1" indent="-288544">
-              <a:spcBef>
-                <a:spcPts val="1020"/>
-              </a:spcBef>
-              <a:spcAft>
-                <a:spcPts val="0"/>
-              </a:spcAft>
+            <a:pPr marL="342900" indent="-342900">
+              <a:buFont typeface="Arial" panose="020B0604020202020204" pitchFamily="34" charset="0"/>
+              <a:buChar char="•"/>
             </a:pPr>
-            <a:endParaRPr lang="en-US" sz="2000" dirty="0" smtClean="0"/>
+            <a:r>
+              <a:rPr lang="en-US" dirty="0"/>
+              <a:t>Our API is hosted on </a:t>
+            </a:r>
+            <a:r>
+              <a:rPr lang="en-US" dirty="0" err="1"/>
+              <a:t>Heroku</a:t>
+            </a:r>
+            <a:r>
+              <a:rPr lang="en-US" dirty="0"/>
+              <a:t>.  We deploy our Java application to </a:t>
+            </a:r>
+            <a:r>
+              <a:rPr lang="en-US" dirty="0" err="1"/>
+              <a:t>Heroku</a:t>
+            </a:r>
+            <a:r>
+              <a:rPr lang="en-US" dirty="0"/>
+              <a:t> using their command line interface.</a:t>
+            </a:r>
           </a:p>
           <a:p>
-            <a:pPr marL="0" marR="0" lvl="0" indent="0" algn="l" rtl="0">
-              <a:spcBef>
-                <a:spcPts val="1080"/>
-              </a:spcBef>
-              <a:spcAft>
-                <a:spcPts val="0"/>
-              </a:spcAft>
-              <a:buClr>
-                <a:schemeClr val="lt1"/>
-              </a:buClr>
-              <a:buSzPct val="25000"/>
-              <a:buFont typeface="Arial"/>
-              <a:buNone/>
-            </a:pPr>
-            <a:endParaRPr sz="2400" b="0" i="0" u="none" strike="noStrike" cap="none" dirty="0">
-              <a:solidFill>
-                <a:schemeClr val="lt1"/>
-              </a:solidFill>
-              <a:latin typeface="Calibri"/>
-              <a:ea typeface="Calibri"/>
-              <a:cs typeface="Calibri"/>
-              <a:sym typeface="Calibri"/>
-            </a:endParaRPr>
-          </a:p>
-          <a:p>
-            <a:pPr marL="0" marR="0" lvl="0" indent="0" algn="l" rtl="0">
-              <a:spcBef>
-                <a:spcPts val="1080"/>
-              </a:spcBef>
-              <a:spcAft>
-                <a:spcPts val="0"/>
-              </a:spcAft>
-              <a:buClr>
-                <a:schemeClr val="lt1"/>
-              </a:buClr>
-              <a:buSzPct val="25000"/>
-              <a:buFont typeface="Arial"/>
-              <a:buNone/>
-            </a:pPr>
-            <a:endParaRPr sz="2400" b="0" i="0" u="none" strike="noStrike" cap="none" dirty="0">
-              <a:solidFill>
-                <a:schemeClr val="lt1"/>
-              </a:solidFill>
-              <a:latin typeface="Calibri"/>
-              <a:ea typeface="Calibri"/>
-              <a:cs typeface="Calibri"/>
-              <a:sym typeface="Calibri"/>
-            </a:endParaRPr>
-          </a:p>
-          <a:p>
-            <a:pPr marL="0" marR="0" lvl="0" indent="0" algn="l" rtl="0">
-              <a:spcBef>
-                <a:spcPts val="1080"/>
-              </a:spcBef>
-              <a:spcAft>
-                <a:spcPts val="0"/>
-              </a:spcAft>
-              <a:buClr>
-                <a:schemeClr val="lt1"/>
-              </a:buClr>
-              <a:buSzPct val="25000"/>
-              <a:buFont typeface="Arial"/>
-              <a:buNone/>
-            </a:pPr>
-            <a:endParaRPr sz="2400" b="0" i="0" u="none" strike="noStrike" cap="none" dirty="0">
-              <a:solidFill>
-                <a:schemeClr val="lt1"/>
-              </a:solidFill>
-              <a:latin typeface="Calibri"/>
-              <a:ea typeface="Calibri"/>
-              <a:cs typeface="Calibri"/>
-              <a:sym typeface="Calibri"/>
-            </a:endParaRPr>
-          </a:p>
-          <a:p>
-            <a:pPr marL="0" marR="0" lvl="0" indent="0" algn="l" rtl="0">
-              <a:spcBef>
-                <a:spcPts val="1080"/>
-              </a:spcBef>
-              <a:spcAft>
-                <a:spcPts val="0"/>
-              </a:spcAft>
-              <a:buClr>
-                <a:schemeClr val="lt1"/>
-              </a:buClr>
-              <a:buSzPct val="25000"/>
-              <a:buFont typeface="Arial"/>
-              <a:buNone/>
-            </a:pPr>
-            <a:endParaRPr sz="2400" b="0" i="0" u="none" strike="noStrike" cap="none" dirty="0">
-              <a:solidFill>
-                <a:schemeClr val="lt1"/>
-              </a:solidFill>
-              <a:latin typeface="Calibri"/>
-              <a:ea typeface="Calibri"/>
-              <a:cs typeface="Calibri"/>
-              <a:sym typeface="Calibri"/>
-            </a:endParaRPr>
-          </a:p>
-          <a:p>
-            <a:pPr marL="0" marR="0" lvl="0" indent="0" algn="l" rtl="0">
-              <a:spcBef>
-                <a:spcPts val="1080"/>
-              </a:spcBef>
-              <a:spcAft>
-                <a:spcPts val="0"/>
-              </a:spcAft>
-              <a:buClr>
-                <a:schemeClr val="lt1"/>
-              </a:buClr>
-              <a:buSzPct val="25000"/>
-              <a:buFont typeface="Arial"/>
-              <a:buNone/>
-            </a:pPr>
-            <a:endParaRPr lang="en-US" sz="2400" b="0" i="0" u="none" strike="noStrike" cap="none" dirty="0" smtClean="0">
-              <a:solidFill>
-                <a:schemeClr val="lt1"/>
-              </a:solidFill>
-              <a:latin typeface="Calibri"/>
-              <a:ea typeface="Calibri"/>
-              <a:cs typeface="Calibri"/>
-              <a:sym typeface="Calibri"/>
-            </a:endParaRPr>
-          </a:p>
-          <a:p>
-            <a:pPr marL="0" marR="0" lvl="0" indent="0" algn="l" rtl="0">
-              <a:spcBef>
-                <a:spcPts val="1080"/>
-              </a:spcBef>
-              <a:spcAft>
-                <a:spcPts val="0"/>
-              </a:spcAft>
-              <a:buClr>
-                <a:schemeClr val="lt1"/>
-              </a:buClr>
-              <a:buSzPct val="25000"/>
-              <a:buFont typeface="Arial"/>
-              <a:buNone/>
+            <a:pPr marL="342900" indent="-342900">
+              <a:buFont typeface="Arial" panose="020B0604020202020204" pitchFamily="34" charset="0"/>
+              <a:buChar char="•"/>
             </a:pPr>
             <a:endParaRPr lang="en-US" dirty="0"/>
           </a:p>
           <a:p>
-            <a:pPr marL="0" marR="0" lvl="0" indent="0" algn="l" rtl="0">
-              <a:spcBef>
-                <a:spcPts val="1080"/>
-              </a:spcBef>
-              <a:spcAft>
-                <a:spcPts val="0"/>
-              </a:spcAft>
-              <a:buClr>
-                <a:schemeClr val="lt1"/>
-              </a:buClr>
-              <a:buSzPct val="25000"/>
-              <a:buFont typeface="Arial"/>
-              <a:buNone/>
+            <a:pPr marL="342900" indent="-342900">
+              <a:buFont typeface="Arial" panose="020B0604020202020204" pitchFamily="34" charset="0"/>
+              <a:buChar char="•"/>
             </a:pPr>
-            <a:endParaRPr lang="en-US" sz="2400" b="0" i="0" u="none" strike="noStrike" cap="none" dirty="0" smtClean="0">
-              <a:solidFill>
-                <a:schemeClr val="lt1"/>
-              </a:solidFill>
-              <a:latin typeface="Calibri"/>
-              <a:ea typeface="Calibri"/>
-              <a:cs typeface="Calibri"/>
-              <a:sym typeface="Calibri"/>
-            </a:endParaRPr>
+            <a:r>
+              <a:rPr lang="en-US" dirty="0"/>
+              <a:t>Our </a:t>
+            </a:r>
+            <a:r>
+              <a:rPr lang="en-US" dirty="0" err="1"/>
+              <a:t>Javascript</a:t>
+            </a:r>
+            <a:r>
+              <a:rPr lang="en-US" dirty="0"/>
+              <a:t> application is hosted on a second </a:t>
+            </a:r>
+            <a:r>
+              <a:rPr lang="en-US" dirty="0" err="1"/>
+              <a:t>Heroku</a:t>
+            </a:r>
+            <a:r>
+              <a:rPr lang="en-US" dirty="0"/>
+              <a:t> application and is deployed by pushing our </a:t>
+            </a:r>
+            <a:r>
+              <a:rPr lang="en-US" dirty="0" err="1"/>
+              <a:t>git</a:t>
+            </a:r>
+            <a:r>
+              <a:rPr lang="en-US" dirty="0"/>
+              <a:t> repository to their </a:t>
+            </a:r>
+            <a:r>
+              <a:rPr lang="en-US" dirty="0" err="1"/>
+              <a:t>git</a:t>
+            </a:r>
+            <a:r>
+              <a:rPr lang="en-US" dirty="0"/>
+              <a:t> remote server</a:t>
+            </a:r>
+            <a:r>
+              <a:rPr lang="en-US" dirty="0" smtClean="0"/>
+              <a:t>.</a:t>
+            </a:r>
           </a:p>
           <a:p>
-            <a:pPr lvl="0">
+            <a:pPr marL="342900" indent="-342900">
+              <a:buFont typeface="Arial" panose="020B0604020202020204" pitchFamily="34" charset="0"/>
+              <a:buChar char="•"/>
+            </a:pPr>
+            <a:endParaRPr lang="en-US" dirty="0"/>
+          </a:p>
+          <a:p>
+            <a:pPr marL="342900" indent="-342900">
+              <a:buFont typeface="Arial" panose="020B0604020202020204" pitchFamily="34" charset="0"/>
+              <a:buChar char="•"/>
+            </a:pPr>
+            <a:r>
+              <a:rPr lang="en-US" dirty="0" smtClean="0"/>
+              <a:t>The high level Product Architecture is given in the backup slide</a:t>
+            </a:r>
+            <a:endParaRPr lang="en-US" dirty="0"/>
+          </a:p>
+          <a:p>
+            <a:pPr marL="342900" indent="-342900">
               <a:spcBef>
                 <a:spcPts val="1080"/>
               </a:spcBef>
@@ -19416,16 +18990,10 @@
                 <a:spcPts val="0"/>
               </a:spcAft>
               <a:buSzPct val="25000"/>
+              <a:buFont typeface="Arial" panose="020B0604020202020204" pitchFamily="34" charset="0"/>
+              <a:buChar char="•"/>
             </a:pPr>
-            <a:r>
-              <a:rPr lang="en-US" sz="1800" dirty="0"/>
-              <a:t>The following screen shows up</a:t>
-            </a:r>
-            <a:r>
-              <a:rPr lang="en-US" sz="1800" dirty="0" smtClean="0"/>
-              <a:t>. For the countries selected, the checklist is 59 items long. Lets go back to the previous screen and click on Vaccine Checklist</a:t>
-            </a:r>
-            <a:endParaRPr sz="1800" b="0" i="0" u="none" strike="noStrike" cap="none" dirty="0">
+            <a:endParaRPr sz="2400" b="0" i="0" u="none" strike="noStrike" cap="none" dirty="0">
               <a:solidFill>
                 <a:schemeClr val="lt1"/>
               </a:solidFill>
@@ -19487,7 +19055,7 @@
                 <a:cs typeface="Calibri"/>
                 <a:sym typeface="Calibri"/>
               </a:rPr>
-              <a:t> 			</a:t>
+              <a:t> 		</a:t>
             </a:r>
             <a:r>
               <a:rPr lang="en-US" sz="2400" b="0" i="0" u="none" strike="noStrike" cap="none" dirty="0" smtClean="0">
@@ -19499,7 +19067,7 @@
                 <a:cs typeface="Calibri"/>
                 <a:sym typeface="Calibri"/>
               </a:rPr>
-              <a:t>SCREEN PROTOTYPES</a:t>
+              <a:t>             PRODUCT DEPLOYMENT</a:t>
             </a:r>
             <a:endParaRPr lang="en-US" sz="2400" b="0" i="0" u="none" strike="noStrike" cap="none" dirty="0">
               <a:solidFill>
@@ -19513,34 +19081,10 @@
           </a:p>
         </p:txBody>
       </p:sp>
-      <p:pic>
-        <p:nvPicPr>
-          <p:cNvPr id="2" name="Picture 1"/>
-          <p:cNvPicPr>
-            <a:picLocks noChangeAspect="1"/>
-          </p:cNvPicPr>
-          <p:nvPr/>
-        </p:nvPicPr>
-        <p:blipFill>
-          <a:blip r:embed="rId3"/>
-          <a:stretch>
-            <a:fillRect/>
-          </a:stretch>
-        </p:blipFill>
-        <p:spPr>
-          <a:xfrm>
-            <a:off x="1608089" y="730227"/>
-            <a:ext cx="4533403" cy="4045940"/>
-          </a:xfrm>
-          <a:prstGeom prst="rect">
-            <a:avLst/>
-          </a:prstGeom>
-        </p:spPr>
-      </p:pic>
     </p:spTree>
     <p:extLst>
       <p:ext uri="{BB962C8B-B14F-4D97-AF65-F5344CB8AC3E}">
-        <p14:creationId xmlns:p14="http://schemas.microsoft.com/office/powerpoint/2010/main" val="173016533"/>
+        <p14:creationId xmlns:p14="http://schemas.microsoft.com/office/powerpoint/2010/main" val="2431240708"/>
       </p:ext>
     </p:extLst>
   </p:cSld>
@@ -19606,34 +19150,49 @@
           </a:bodyPr>
           <a:lstStyle/>
           <a:p>
-            <a:pPr lvl="1" indent="-288544">
-              <a:spcBef>
-                <a:spcPts val="1020"/>
+            <a:pPr marL="342900" indent="-342900">
+              <a:spcBef>
+                <a:spcPts val="1080"/>
               </a:spcBef>
               <a:spcAft>
                 <a:spcPts val="0"/>
               </a:spcAft>
+              <a:buSzPct val="25000"/>
+              <a:buFont typeface="Arial" panose="020B0604020202020204" pitchFamily="34" charset="0"/>
+              <a:buChar char="•"/>
             </a:pPr>
-            <a:endParaRPr lang="en-US" sz="2000" dirty="0" smtClean="0"/>
+            <a:r>
+              <a:rPr lang="en-US" dirty="0">
+                <a:solidFill>
+                  <a:schemeClr val="bg1"/>
+                </a:solidFill>
+              </a:rPr>
+              <a:t>FHIR integration for our user vaccinations </a:t>
+            </a:r>
+            <a:r>
+              <a:rPr lang="en-US" dirty="0" smtClean="0">
+                <a:solidFill>
+                  <a:schemeClr val="bg1"/>
+                </a:solidFill>
+              </a:rPr>
+              <a:t>feature</a:t>
+            </a:r>
           </a:p>
           <a:p>
-            <a:pPr marL="0" marR="0" lvl="0" indent="0" algn="l" rtl="0">
+            <a:pPr marL="342900" indent="-342900">
               <a:spcBef>
                 <a:spcPts val="1080"/>
               </a:spcBef>
               <a:spcAft>
                 <a:spcPts val="0"/>
               </a:spcAft>
-              <a:buClr>
-                <a:schemeClr val="lt1"/>
-              </a:buClr>
               <a:buSzPct val="25000"/>
-              <a:buFont typeface="Arial"/>
-              <a:buNone/>
+              <a:buFont typeface="Arial" panose="020B0604020202020204" pitchFamily="34" charset="0"/>
+              <a:buChar char="•"/>
             </a:pPr>
-            <a:endParaRPr sz="2400" b="0" i="0" u="none" strike="noStrike" cap="none" dirty="0">
+            <a:endParaRPr lang="en-US" sz="2400" b="0" i="0" u="none" strike="noStrike" cap="none" dirty="0">
               <a:solidFill>
-                <a:schemeClr val="lt1"/>
+                <a:schemeClr val="bg1"/>
               </a:solidFill>
               <a:latin typeface="Calibri"/>
               <a:ea typeface="Calibri"/>
@@ -19642,23 +19201,41 @@
             </a:endParaRPr>
           </a:p>
           <a:p>
-            <a:pPr marL="0" marR="0" lvl="0" indent="0" algn="l" rtl="0">
+            <a:pPr marL="342900" indent="-342900">
               <a:spcBef>
                 <a:spcPts val="1080"/>
               </a:spcBef>
               <a:spcAft>
                 <a:spcPts val="0"/>
               </a:spcAft>
-              <a:buClr>
-                <a:schemeClr val="lt1"/>
-              </a:buClr>
               <a:buSzPct val="25000"/>
-              <a:buFont typeface="Arial"/>
-              <a:buNone/>
+              <a:buFont typeface="Arial" panose="020B0604020202020204" pitchFamily="34" charset="0"/>
+              <a:buChar char="•"/>
             </a:pPr>
-            <a:endParaRPr sz="2400" b="0" i="0" u="none" strike="noStrike" cap="none" dirty="0">
+            <a:r>
+              <a:rPr lang="en-US" dirty="0" smtClean="0">
+                <a:solidFill>
+                  <a:schemeClr val="bg1"/>
+                </a:solidFill>
+              </a:rPr>
+              <a:t>Implementation and Testing of Disease to vaccination and medical mapping feature.</a:t>
+            </a:r>
+          </a:p>
+          <a:p>
+            <a:pPr marL="342900" indent="-342900">
+              <a:spcBef>
+                <a:spcPts val="1080"/>
+              </a:spcBef>
+              <a:spcAft>
+                <a:spcPts val="0"/>
+              </a:spcAft>
+              <a:buSzPct val="25000"/>
+              <a:buFont typeface="Arial" panose="020B0604020202020204" pitchFamily="34" charset="0"/>
+              <a:buChar char="•"/>
+            </a:pPr>
+            <a:endParaRPr lang="en-US" sz="2400" b="0" i="0" u="none" strike="noStrike" cap="none" dirty="0">
               <a:solidFill>
-                <a:schemeClr val="lt1"/>
+                <a:schemeClr val="bg1"/>
               </a:solidFill>
               <a:latin typeface="Calibri"/>
               <a:ea typeface="Calibri"/>
@@ -19667,23 +19244,41 @@
             </a:endParaRPr>
           </a:p>
           <a:p>
-            <a:pPr marL="0" marR="0" lvl="0" indent="0" algn="l" rtl="0">
+            <a:pPr marL="342900" indent="-342900">
               <a:spcBef>
                 <a:spcPts val="1080"/>
               </a:spcBef>
               <a:spcAft>
                 <a:spcPts val="0"/>
               </a:spcAft>
-              <a:buClr>
-                <a:schemeClr val="lt1"/>
-              </a:buClr>
               <a:buSzPct val="25000"/>
-              <a:buFont typeface="Arial"/>
-              <a:buNone/>
+              <a:buFont typeface="Arial" panose="020B0604020202020204" pitchFamily="34" charset="0"/>
+              <a:buChar char="•"/>
             </a:pPr>
-            <a:endParaRPr sz="2400" b="0" i="0" u="none" strike="noStrike" cap="none" dirty="0">
+            <a:r>
+              <a:rPr lang="en-US" dirty="0" smtClean="0">
+                <a:solidFill>
+                  <a:schemeClr val="bg1"/>
+                </a:solidFill>
+              </a:rPr>
+              <a:t>Testing of email notification feature</a:t>
+            </a:r>
+          </a:p>
+          <a:p>
+            <a:pPr marL="342900" indent="-342900">
+              <a:spcBef>
+                <a:spcPts val="1080"/>
+              </a:spcBef>
+              <a:spcAft>
+                <a:spcPts val="0"/>
+              </a:spcAft>
+              <a:buSzPct val="25000"/>
+              <a:buFont typeface="Arial" panose="020B0604020202020204" pitchFamily="34" charset="0"/>
+              <a:buChar char="•"/>
+            </a:pPr>
+            <a:endParaRPr lang="en-US" sz="2400" b="0" i="0" u="none" strike="noStrike" cap="none" dirty="0">
               <a:solidFill>
-                <a:schemeClr val="lt1"/>
+                <a:schemeClr val="bg1"/>
               </a:solidFill>
               <a:latin typeface="Calibri"/>
               <a:ea typeface="Calibri"/>
@@ -19692,142 +19287,26 @@
             </a:endParaRPr>
           </a:p>
           <a:p>
-            <a:pPr marL="0" marR="0" lvl="0" indent="0" algn="l" rtl="0">
+            <a:pPr marL="342900" indent="-342900">
               <a:spcBef>
                 <a:spcPts val="1080"/>
               </a:spcBef>
               <a:spcAft>
                 <a:spcPts val="0"/>
               </a:spcAft>
-              <a:buClr>
-                <a:schemeClr val="lt1"/>
-              </a:buClr>
               <a:buSzPct val="25000"/>
-              <a:buFont typeface="Arial"/>
-              <a:buNone/>
-            </a:pPr>
-            <a:endParaRPr sz="2400" b="0" i="0" u="none" strike="noStrike" cap="none" dirty="0">
-              <a:solidFill>
-                <a:schemeClr val="lt1"/>
-              </a:solidFill>
-              <a:latin typeface="Calibri"/>
-              <a:ea typeface="Calibri"/>
-              <a:cs typeface="Calibri"/>
-              <a:sym typeface="Calibri"/>
-            </a:endParaRPr>
-          </a:p>
-          <a:p>
-            <a:pPr marL="0" marR="0" lvl="0" indent="0" algn="l" rtl="0">
-              <a:spcBef>
-                <a:spcPts val="1080"/>
-              </a:spcBef>
-              <a:spcAft>
-                <a:spcPts val="0"/>
-              </a:spcAft>
-              <a:buClr>
-                <a:schemeClr val="lt1"/>
-              </a:buClr>
-              <a:buSzPct val="25000"/>
-              <a:buFont typeface="Arial"/>
-              <a:buNone/>
-            </a:pPr>
-            <a:endParaRPr lang="en-US" sz="2400" b="0" i="0" u="none" strike="noStrike" cap="none" dirty="0" smtClean="0">
-              <a:solidFill>
-                <a:schemeClr val="lt1"/>
-              </a:solidFill>
-              <a:latin typeface="Calibri"/>
-              <a:ea typeface="Calibri"/>
-              <a:cs typeface="Calibri"/>
-              <a:sym typeface="Calibri"/>
-            </a:endParaRPr>
-          </a:p>
-          <a:p>
-            <a:pPr marL="0" marR="0" lvl="0" indent="0" algn="l" rtl="0">
-              <a:spcBef>
-                <a:spcPts val="1080"/>
-              </a:spcBef>
-              <a:spcAft>
-                <a:spcPts val="0"/>
-              </a:spcAft>
-              <a:buClr>
-                <a:schemeClr val="lt1"/>
-              </a:buClr>
-              <a:buSzPct val="25000"/>
-              <a:buFont typeface="Arial"/>
-              <a:buNone/>
-            </a:pPr>
-            <a:endParaRPr lang="en-US" dirty="0"/>
-          </a:p>
-          <a:p>
-            <a:pPr marL="0" marR="0" lvl="0" indent="0" algn="l" rtl="0">
-              <a:spcBef>
-                <a:spcPts val="1080"/>
-              </a:spcBef>
-              <a:spcAft>
-                <a:spcPts val="0"/>
-              </a:spcAft>
-              <a:buClr>
-                <a:schemeClr val="lt1"/>
-              </a:buClr>
-              <a:buSzPct val="25000"/>
-              <a:buFont typeface="Arial"/>
-              <a:buNone/>
-            </a:pPr>
-            <a:endParaRPr lang="en-US" sz="2400" b="0" i="0" u="none" strike="noStrike" cap="none" dirty="0" smtClean="0">
-              <a:solidFill>
-                <a:schemeClr val="lt1"/>
-              </a:solidFill>
-              <a:latin typeface="Calibri"/>
-              <a:ea typeface="Calibri"/>
-              <a:cs typeface="Calibri"/>
-              <a:sym typeface="Calibri"/>
-            </a:endParaRPr>
-          </a:p>
-          <a:p>
-            <a:pPr marL="0" marR="0" lvl="0" indent="0" algn="l" rtl="0">
-              <a:spcBef>
-                <a:spcPts val="1080"/>
-              </a:spcBef>
-              <a:spcAft>
-                <a:spcPts val="0"/>
-              </a:spcAft>
-              <a:buClr>
-                <a:schemeClr val="lt1"/>
-              </a:buClr>
-              <a:buSzPct val="25000"/>
-              <a:buFont typeface="Arial"/>
-              <a:buNone/>
-            </a:pPr>
-            <a:endParaRPr lang="en-US" dirty="0"/>
-          </a:p>
-          <a:p>
-            <a:pPr marL="0" marR="0" lvl="0" indent="0" algn="l" rtl="0">
-              <a:spcBef>
-                <a:spcPts val="1080"/>
-              </a:spcBef>
-              <a:spcAft>
-                <a:spcPts val="0"/>
-              </a:spcAft>
-              <a:buClr>
-                <a:schemeClr val="lt1"/>
-              </a:buClr>
-              <a:buSzPct val="25000"/>
-              <a:buFont typeface="Arial"/>
-              <a:buNone/>
+              <a:buFont typeface="Arial" panose="020B0604020202020204" pitchFamily="34" charset="0"/>
+              <a:buChar char="•"/>
             </a:pPr>
             <a:r>
-              <a:rPr lang="en-US" sz="2000" b="0" i="0" u="none" strike="noStrike" cap="none" dirty="0" smtClean="0">
-                <a:solidFill>
-                  <a:schemeClr val="lt1"/>
-                </a:solidFill>
-                <a:latin typeface="Calibri"/>
-                <a:ea typeface="Calibri"/>
-                <a:cs typeface="Calibri"/>
-                <a:sym typeface="Calibri"/>
+              <a:rPr lang="en-US" dirty="0" smtClean="0">
+                <a:solidFill>
+                  <a:schemeClr val="bg1"/>
+                </a:solidFill>
               </a:rPr>
-              <a:t>The checklist with the list of relevant vaccines gets displayed. Go back to previous screen and now click on alerts.</a:t>
+              <a:t>End to End Testing, community demo and feedback gathering.</a:t>
             </a:r>
-            <a:endParaRPr lang="en-US" sz="2000" b="0" i="0" u="none" strike="noStrike" cap="none" dirty="0" smtClean="0">
+            <a:endParaRPr sz="2400" b="0" i="0" u="none" strike="noStrike" cap="none" dirty="0">
               <a:solidFill>
                 <a:schemeClr val="lt1"/>
               </a:solidFill>
@@ -19889,7 +19368,7 @@
                 <a:cs typeface="Calibri"/>
                 <a:sym typeface="Calibri"/>
               </a:rPr>
-              <a:t> 			</a:t>
+              <a:t> 		</a:t>
             </a:r>
             <a:r>
               <a:rPr lang="en-US" sz="2400" b="0" i="0" u="none" strike="noStrike" cap="none" dirty="0" smtClean="0">
@@ -19901,7 +19380,7 @@
                 <a:cs typeface="Calibri"/>
                 <a:sym typeface="Calibri"/>
               </a:rPr>
-              <a:t>SCREEN PROTOTYPES</a:t>
+              <a:t>OUTSTANDING ELEMENTS OF APPLICATION</a:t>
             </a:r>
             <a:endParaRPr lang="en-US" sz="2400" b="0" i="0" u="none" strike="noStrike" cap="none" dirty="0">
               <a:solidFill>
@@ -19915,34 +19394,10 @@
           </a:p>
         </p:txBody>
       </p:sp>
-      <p:pic>
-        <p:nvPicPr>
-          <p:cNvPr id="4" name="Picture 3"/>
-          <p:cNvPicPr>
-            <a:picLocks noChangeAspect="1"/>
-          </p:cNvPicPr>
-          <p:nvPr/>
-        </p:nvPicPr>
-        <p:blipFill>
-          <a:blip r:embed="rId3"/>
-          <a:stretch>
-            <a:fillRect/>
-          </a:stretch>
-        </p:blipFill>
-        <p:spPr>
-          <a:xfrm>
-            <a:off x="1652943" y="748849"/>
-            <a:ext cx="5619750" cy="4295775"/>
-          </a:xfrm>
-          <a:prstGeom prst="rect">
-            <a:avLst/>
-          </a:prstGeom>
-        </p:spPr>
-      </p:pic>
     </p:spTree>
     <p:extLst>
       <p:ext uri="{BB962C8B-B14F-4D97-AF65-F5344CB8AC3E}">
-        <p14:creationId xmlns:p14="http://schemas.microsoft.com/office/powerpoint/2010/main" val="2465833709"/>
+        <p14:creationId xmlns:p14="http://schemas.microsoft.com/office/powerpoint/2010/main" val="260339633"/>
       </p:ext>
     </p:extLst>
   </p:cSld>
@@ -19967,7 +19422,7 @@
   <p:cSld>
     <p:spTree>
       <p:nvGrpSpPr>
-        <p:cNvPr id="1" name="Shape 131"/>
+        <p:cNvPr id="1" name="Shape 143"/>
         <p:cNvGrpSpPr/>
         <p:nvPr/>
       </p:nvGrpSpPr>
@@ -19981,7 +19436,7 @@
       </p:grpSpPr>
       <p:sp>
         <p:nvSpPr>
-          <p:cNvPr id="132" name="Shape 132"/>
+          <p:cNvPr id="144" name="Shape 144"/>
           <p:cNvSpPr txBox="1">
             <a:spLocks noGrp="1"/>
           </p:cNvSpPr>
@@ -20008,17 +19463,6 @@
           </a:bodyPr>
           <a:lstStyle/>
           <a:p>
-            <a:pPr lvl="1" indent="-288544">
-              <a:spcBef>
-                <a:spcPts val="1020"/>
-              </a:spcBef>
-              <a:spcAft>
-                <a:spcPts val="0"/>
-              </a:spcAft>
-            </a:pPr>
-            <a:endParaRPr lang="en-US" sz="2000" dirty="0" smtClean="0"/>
-          </a:p>
-          <a:p>
             <a:pPr marL="0" marR="0" lvl="0" indent="0" algn="l" rtl="0">
               <a:spcBef>
                 <a:spcPts val="1080"/>
@@ -20044,146 +19488,41 @@
             </a:endParaRPr>
           </a:p>
           <a:p>
-            <a:pPr marL="0" marR="0" lvl="0" indent="0" algn="l" rtl="0">
-              <a:spcBef>
-                <a:spcPts val="1080"/>
-              </a:spcBef>
-              <a:spcAft>
-                <a:spcPts val="0"/>
-              </a:spcAft>
-              <a:buClr>
-                <a:schemeClr val="lt1"/>
-              </a:buClr>
-              <a:buSzPct val="25000"/>
-              <a:buFont typeface="Arial"/>
-              <a:buNone/>
+            <a:pPr marL="342900" indent="-342900">
+              <a:buFont typeface="Arial" panose="020B0604020202020204" pitchFamily="34" charset="0"/>
+              <a:buChar char="•"/>
             </a:pPr>
-            <a:endParaRPr sz="2400" b="0" i="0" u="none" strike="noStrike" cap="none" dirty="0">
-              <a:solidFill>
-                <a:schemeClr val="lt1"/>
-              </a:solidFill>
-              <a:latin typeface="Calibri"/>
-              <a:ea typeface="Calibri"/>
-              <a:cs typeface="Calibri"/>
-              <a:sym typeface="Calibri"/>
-            </a:endParaRPr>
+            <a:r>
+              <a:rPr lang="en-US" dirty="0" smtClean="0"/>
+              <a:t>Integrating </a:t>
+            </a:r>
+            <a:r>
+              <a:rPr lang="en-US" dirty="0"/>
+              <a:t>and authenticating with the FHIR server:  We ultimately decided to create new FHIR users when a user account is created on safe-travels. We then can sync vaccine data from our application with FHIR. We also had to map all our CDC vaccine names to vaccine codes that are usable with FHIR.</a:t>
+            </a:r>
           </a:p>
           <a:p>
-            <a:pPr marL="0" marR="0" lvl="0" indent="0" algn="l" rtl="0">
-              <a:spcBef>
-                <a:spcPts val="1080"/>
-              </a:spcBef>
-              <a:spcAft>
-                <a:spcPts val="0"/>
-              </a:spcAft>
-              <a:buClr>
-                <a:schemeClr val="lt1"/>
-              </a:buClr>
-              <a:buSzPct val="25000"/>
-              <a:buFont typeface="Arial"/>
-              <a:buNone/>
-            </a:pPr>
-            <a:endParaRPr sz="2400" b="0" i="0" u="none" strike="noStrike" cap="none" dirty="0">
-              <a:solidFill>
-                <a:schemeClr val="lt1"/>
-              </a:solidFill>
-              <a:latin typeface="Calibri"/>
-              <a:ea typeface="Calibri"/>
-              <a:cs typeface="Calibri"/>
-              <a:sym typeface="Calibri"/>
-            </a:endParaRPr>
-          </a:p>
-          <a:p>
-            <a:pPr marL="0" marR="0" lvl="0" indent="0" algn="l" rtl="0">
-              <a:spcBef>
-                <a:spcPts val="1080"/>
-              </a:spcBef>
-              <a:spcAft>
-                <a:spcPts val="0"/>
-              </a:spcAft>
-              <a:buClr>
-                <a:schemeClr val="lt1"/>
-              </a:buClr>
-              <a:buSzPct val="25000"/>
-              <a:buFont typeface="Arial"/>
-              <a:buNone/>
-            </a:pPr>
-            <a:endParaRPr sz="2400" b="0" i="0" u="none" strike="noStrike" cap="none" dirty="0">
-              <a:solidFill>
-                <a:schemeClr val="lt1"/>
-              </a:solidFill>
-              <a:latin typeface="Calibri"/>
-              <a:ea typeface="Calibri"/>
-              <a:cs typeface="Calibri"/>
-              <a:sym typeface="Calibri"/>
-            </a:endParaRPr>
-          </a:p>
-          <a:p>
-            <a:pPr marL="0" marR="0" lvl="0" indent="0" algn="l" rtl="0">
-              <a:spcBef>
-                <a:spcPts val="1080"/>
-              </a:spcBef>
-              <a:spcAft>
-                <a:spcPts val="0"/>
-              </a:spcAft>
-              <a:buClr>
-                <a:schemeClr val="lt1"/>
-              </a:buClr>
-              <a:buSzPct val="25000"/>
-              <a:buFont typeface="Arial"/>
-              <a:buNone/>
-            </a:pPr>
-            <a:endParaRPr lang="en-US" sz="2400" b="0" i="0" u="none" strike="noStrike" cap="none" dirty="0" smtClean="0">
-              <a:solidFill>
-                <a:schemeClr val="lt1"/>
-              </a:solidFill>
-              <a:latin typeface="Calibri"/>
-              <a:ea typeface="Calibri"/>
-              <a:cs typeface="Calibri"/>
-              <a:sym typeface="Calibri"/>
-            </a:endParaRPr>
-          </a:p>
-          <a:p>
-            <a:pPr marL="0" marR="0" lvl="0" indent="0" algn="l" rtl="0">
-              <a:spcBef>
-                <a:spcPts val="1080"/>
-              </a:spcBef>
-              <a:spcAft>
-                <a:spcPts val="0"/>
-              </a:spcAft>
-              <a:buClr>
-                <a:schemeClr val="lt1"/>
-              </a:buClr>
-              <a:buSzPct val="25000"/>
-              <a:buFont typeface="Arial"/>
-              <a:buNone/>
+            <a:pPr marL="342900" indent="-342900">
+              <a:buFont typeface="Arial" panose="020B0604020202020204" pitchFamily="34" charset="0"/>
+              <a:buChar char="•"/>
             </a:pPr>
             <a:endParaRPr lang="en-US" dirty="0"/>
           </a:p>
           <a:p>
-            <a:pPr marL="0" marR="0" lvl="0" indent="0" algn="l" rtl="0">
-              <a:spcBef>
-                <a:spcPts val="1080"/>
-              </a:spcBef>
-              <a:spcAft>
-                <a:spcPts val="0"/>
-              </a:spcAft>
-              <a:buClr>
-                <a:schemeClr val="lt1"/>
-              </a:buClr>
-              <a:buSzPct val="25000"/>
-              <a:buFont typeface="Arial"/>
-              <a:buNone/>
+            <a:pPr marL="342900" indent="-342900">
+              <a:buFont typeface="Arial" panose="020B0604020202020204" pitchFamily="34" charset="0"/>
+              <a:buChar char="•"/>
             </a:pPr>
-            <a:endParaRPr lang="en-US" sz="2400" b="0" i="0" u="none" strike="noStrike" cap="none" dirty="0" smtClean="0">
-              <a:solidFill>
-                <a:schemeClr val="lt1"/>
-              </a:solidFill>
-              <a:latin typeface="Calibri"/>
-              <a:ea typeface="Calibri"/>
-              <a:cs typeface="Calibri"/>
-              <a:sym typeface="Calibri"/>
-            </a:endParaRPr>
+            <a:r>
+              <a:rPr lang="en-US" dirty="0"/>
+              <a:t>Email Integration:  We had some difficulty finding an email provider to integrate our application with.  After hitting some dead ends, we decided to go with SendGrid which provided an easy-to-use Java API.</a:t>
+            </a:r>
+          </a:p>
+          <a:p>
+            <a:r>
+              <a:rPr lang="en-US" dirty="0"/>
+              <a:t> </a:t>
+            </a:r>
           </a:p>
           <a:p>
             <a:pPr marL="0" marR="0" lvl="0" indent="0" algn="l" rtl="0">
@@ -20200,43 +19539,7 @@
               <a:buFont typeface="Arial"/>
               <a:buNone/>
             </a:pPr>
-            <a:r>
-              <a:rPr lang="en-US" sz="1800" b="0" i="0" u="none" strike="noStrike" cap="none" dirty="0" smtClean="0">
-                <a:solidFill>
-                  <a:schemeClr val="lt1"/>
-                </a:solidFill>
-                <a:latin typeface="Calibri"/>
-                <a:ea typeface="Calibri"/>
-                <a:cs typeface="Calibri"/>
-                <a:sym typeface="Calibri"/>
-              </a:rPr>
-              <a:t>The Alerts </a:t>
-            </a:r>
-            <a:r>
-              <a:rPr lang="en-US" sz="1800" b="0" i="0" u="none" strike="noStrike" cap="none" dirty="0" smtClean="0">
-                <a:solidFill>
-                  <a:schemeClr val="lt1"/>
-                </a:solidFill>
-                <a:latin typeface="Calibri"/>
-                <a:ea typeface="Calibri"/>
-                <a:cs typeface="Calibri"/>
-                <a:sym typeface="Calibri"/>
-              </a:rPr>
-              <a:t>screen shows up. </a:t>
-            </a:r>
-            <a:r>
-              <a:rPr lang="en-US" sz="1800" b="0" i="0" u="none" strike="noStrike" cap="none" dirty="0" smtClean="0">
-                <a:solidFill>
-                  <a:schemeClr val="lt1"/>
-                </a:solidFill>
-                <a:latin typeface="Calibri"/>
-                <a:ea typeface="Calibri"/>
-                <a:cs typeface="Calibri"/>
-                <a:sym typeface="Calibri"/>
-              </a:rPr>
-              <a:t> This has warning about Yellow Fever in Angola. Now go back to the last screen and click on User Profile.</a:t>
-            </a:r>
-            <a:endParaRPr sz="1800" b="0" i="0" u="none" strike="noStrike" cap="none" dirty="0">
+            <a:endParaRPr sz="2400" b="0" i="0" u="none" strike="noStrike" cap="none" dirty="0">
               <a:solidFill>
                 <a:schemeClr val="lt1"/>
               </a:solidFill>
@@ -20250,7 +19553,286 @@
       </p:sp>
       <p:sp>
         <p:nvSpPr>
-          <p:cNvPr id="133" name="Shape 133"/>
+          <p:cNvPr id="145" name="Shape 145"/>
+          <p:cNvSpPr txBox="1">
+            <a:spLocks noGrp="1"/>
+          </p:cNvSpPr>
+          <p:nvPr>
+            <p:ph type="title"/>
+          </p:nvPr>
+        </p:nvSpPr>
+        <p:spPr>
+          <a:xfrm>
+            <a:off x="0" y="0"/>
+            <a:ext cx="9144000" cy="991351"/>
+          </a:xfrm>
+          <a:prstGeom prst="rect">
+            <a:avLst/>
+          </a:prstGeom>
+          <a:noFill/>
+          <a:ln>
+            <a:noFill/>
+          </a:ln>
+        </p:spPr>
+        <p:txBody>
+          <a:bodyPr lIns="274300" tIns="45700" rIns="91425" bIns="45700" anchor="ctr" anchorCtr="0">
+            <a:noAutofit/>
+          </a:bodyPr>
+          <a:lstStyle/>
+          <a:p>
+            <a:pPr lvl="0">
+              <a:buSzPct val="25000"/>
+            </a:pPr>
+            <a:r>
+              <a:rPr lang="en-US" sz="2400" b="0" i="0" u="none" strike="noStrike" cap="none" dirty="0">
+                <a:solidFill>
+                  <a:srgbClr val="EEB211"/>
+                </a:solidFill>
+                <a:latin typeface="Calibri"/>
+                <a:ea typeface="Calibri"/>
+                <a:cs typeface="Calibri"/>
+                <a:sym typeface="Calibri"/>
+              </a:rPr>
+              <a:t> 			</a:t>
+            </a:r>
+            <a:r>
+              <a:rPr lang="en-US" sz="2400" b="0" i="0" u="none" strike="noStrike" cap="none" dirty="0" smtClean="0">
+                <a:solidFill>
+                  <a:srgbClr val="EEB211"/>
+                </a:solidFill>
+                <a:latin typeface="Calibri"/>
+                <a:ea typeface="Calibri"/>
+                <a:cs typeface="Calibri"/>
+                <a:sym typeface="Calibri"/>
+              </a:rPr>
+              <a:t> </a:t>
+            </a:r>
+            <a:r>
+              <a:rPr lang="en-US" dirty="0"/>
+              <a:t> CHALLENGES WE FACED</a:t>
+            </a:r>
+            <a:endParaRPr lang="en-US" sz="2400" b="0" i="0" u="none" strike="noStrike" cap="none" dirty="0">
+              <a:solidFill>
+                <a:srgbClr val="EEB211"/>
+              </a:solidFill>
+              <a:latin typeface="Calibri"/>
+              <a:ea typeface="Calibri"/>
+              <a:cs typeface="Calibri"/>
+              <a:sym typeface="Calibri"/>
+            </a:endParaRPr>
+          </a:p>
+        </p:txBody>
+      </p:sp>
+    </p:spTree>
+  </p:cSld>
+  <p:clrMapOvr>
+    <a:masterClrMapping/>
+  </p:clrMapOvr>
+  <p:transition spd="slow">
+    <p:cut/>
+  </p:transition>
+  <p:timing>
+    <p:tnLst>
+      <p:par>
+        <p:cTn id="1" dur="indefinite" restart="never" nodeType="tmRoot"/>
+      </p:par>
+    </p:tnLst>
+  </p:timing>
+</p:sld>
+</file>
+
+<file path=ppt/slides/slide13.xml><?xml version="1.0" encoding="utf-8"?>
+<p:sld xmlns:a="http://schemas.openxmlformats.org/drawingml/2006/main" xmlns:r="http://schemas.openxmlformats.org/officeDocument/2006/relationships" xmlns:p="http://schemas.openxmlformats.org/presentationml/2006/main">
+  <p:cSld>
+    <p:spTree>
+      <p:nvGrpSpPr>
+        <p:cNvPr id="1" name="Shape 143"/>
+        <p:cNvGrpSpPr/>
+        <p:nvPr/>
+      </p:nvGrpSpPr>
+      <p:grpSpPr>
+        <a:xfrm>
+          <a:off x="0" y="0"/>
+          <a:ext cx="0" cy="0"/>
+          <a:chOff x="0" y="0"/>
+          <a:chExt cx="0" cy="0"/>
+        </a:xfrm>
+      </p:grpSpPr>
+      <p:sp>
+        <p:nvSpPr>
+          <p:cNvPr id="144" name="Shape 144"/>
+          <p:cNvSpPr txBox="1">
+            <a:spLocks noGrp="1"/>
+          </p:cNvSpPr>
+          <p:nvPr>
+            <p:ph type="body" idx="1"/>
+          </p:nvPr>
+        </p:nvSpPr>
+        <p:spPr>
+          <a:xfrm>
+            <a:off x="0" y="999067"/>
+            <a:ext cx="9143998" cy="5164664"/>
+          </a:xfrm>
+          <a:prstGeom prst="rect">
+            <a:avLst/>
+          </a:prstGeom>
+          <a:noFill/>
+          <a:ln>
+            <a:noFill/>
+          </a:ln>
+        </p:spPr>
+        <p:txBody>
+          <a:bodyPr lIns="274300" tIns="45700" rIns="274300" bIns="45700" anchor="t" anchorCtr="0">
+            <a:noAutofit/>
+          </a:bodyPr>
+          <a:lstStyle/>
+          <a:p>
+            <a:pPr marL="0" marR="0" lvl="0" indent="0" algn="l" rtl="0">
+              <a:spcBef>
+                <a:spcPts val="1080"/>
+              </a:spcBef>
+              <a:spcAft>
+                <a:spcPts val="0"/>
+              </a:spcAft>
+              <a:buClr>
+                <a:schemeClr val="lt1"/>
+              </a:buClr>
+              <a:buSzPct val="25000"/>
+              <a:buFont typeface="Arial"/>
+              <a:buNone/>
+            </a:pPr>
+            <a:endParaRPr sz="2400" b="0" i="0" u="none" strike="noStrike" cap="none" dirty="0">
+              <a:solidFill>
+                <a:schemeClr val="lt1"/>
+              </a:solidFill>
+              <a:latin typeface="Calibri"/>
+              <a:ea typeface="Calibri"/>
+              <a:cs typeface="Calibri"/>
+              <a:sym typeface="Calibri"/>
+            </a:endParaRPr>
+          </a:p>
+          <a:p>
+            <a:pPr marL="342900" indent="-342900">
+              <a:buFont typeface="Arial" panose="020B0604020202020204" pitchFamily="34" charset="0"/>
+              <a:buChar char="•"/>
+            </a:pPr>
+            <a:r>
+              <a:rPr lang="en-US" dirty="0" smtClean="0"/>
+              <a:t>UI </a:t>
+            </a:r>
+            <a:r>
+              <a:rPr lang="en-US" dirty="0"/>
+              <a:t>Challenges:  We had various UI challenges, specifically figuring out how to display CDC alerts and how to allow users to mark off vaccinations as current</a:t>
+            </a:r>
+            <a:r>
+              <a:rPr lang="en-US" dirty="0" smtClean="0"/>
+              <a:t>.</a:t>
+            </a:r>
+          </a:p>
+          <a:p>
+            <a:pPr marL="342900" indent="-342900">
+              <a:buFont typeface="Arial" panose="020B0604020202020204" pitchFamily="34" charset="0"/>
+              <a:buChar char="•"/>
+            </a:pPr>
+            <a:endParaRPr lang="en-US" dirty="0"/>
+          </a:p>
+          <a:p>
+            <a:pPr marL="342900" indent="-342900">
+              <a:buFont typeface="Arial" panose="020B0604020202020204" pitchFamily="34" charset="0"/>
+              <a:buChar char="•"/>
+            </a:pPr>
+            <a:r>
+              <a:rPr lang="en-US" dirty="0"/>
+              <a:t>User Authentication Challenges: We spent significant time and effort extending our Java user authentication library, spark-pac4j, because some of the functionality we needed was not present by default.</a:t>
+            </a:r>
+          </a:p>
+          <a:p>
+            <a:pPr marL="342900" indent="-342900">
+              <a:buFont typeface="Arial" panose="020B0604020202020204" pitchFamily="34" charset="0"/>
+              <a:buChar char="•"/>
+            </a:pPr>
+            <a:endParaRPr lang="en-US" dirty="0"/>
+          </a:p>
+          <a:p>
+            <a:pPr marL="0" marR="0" lvl="0" indent="0" algn="l" rtl="0">
+              <a:spcBef>
+                <a:spcPts val="1080"/>
+              </a:spcBef>
+              <a:spcAft>
+                <a:spcPts val="0"/>
+              </a:spcAft>
+              <a:buClr>
+                <a:schemeClr val="lt1"/>
+              </a:buClr>
+              <a:buSzPct val="25000"/>
+              <a:buFont typeface="Arial"/>
+              <a:buNone/>
+            </a:pPr>
+            <a:endParaRPr sz="2400" b="0" i="0" u="none" strike="noStrike" cap="none" dirty="0">
+              <a:solidFill>
+                <a:schemeClr val="lt1"/>
+              </a:solidFill>
+              <a:latin typeface="Calibri"/>
+              <a:ea typeface="Calibri"/>
+              <a:cs typeface="Calibri"/>
+              <a:sym typeface="Calibri"/>
+            </a:endParaRPr>
+          </a:p>
+          <a:p>
+            <a:pPr marL="0" marR="0" lvl="0" indent="0" algn="l" rtl="0">
+              <a:spcBef>
+                <a:spcPts val="1080"/>
+              </a:spcBef>
+              <a:spcAft>
+                <a:spcPts val="0"/>
+              </a:spcAft>
+              <a:buClr>
+                <a:schemeClr val="lt1"/>
+              </a:buClr>
+              <a:buSzPct val="25000"/>
+              <a:buFont typeface="Arial"/>
+              <a:buNone/>
+            </a:pPr>
+            <a:endParaRPr sz="2400" b="0" i="0" u="none" strike="noStrike" cap="none" dirty="0">
+              <a:solidFill>
+                <a:schemeClr val="lt1"/>
+              </a:solidFill>
+              <a:latin typeface="Calibri"/>
+              <a:ea typeface="Calibri"/>
+              <a:cs typeface="Calibri"/>
+              <a:sym typeface="Calibri"/>
+            </a:endParaRPr>
+          </a:p>
+          <a:p>
+            <a:pPr marL="0" marR="0" lvl="0" indent="0" algn="l" rtl="0">
+              <a:spcBef>
+                <a:spcPts val="1080"/>
+              </a:spcBef>
+              <a:spcAft>
+                <a:spcPts val="0"/>
+              </a:spcAft>
+              <a:buClr>
+                <a:schemeClr val="lt1"/>
+              </a:buClr>
+              <a:buSzPct val="25000"/>
+              <a:buFont typeface="Arial"/>
+              <a:buNone/>
+            </a:pPr>
+            <a:endParaRPr sz="2400" b="0" i="0" u="none" strike="noStrike" cap="none" dirty="0">
+              <a:solidFill>
+                <a:schemeClr val="lt1"/>
+              </a:solidFill>
+              <a:latin typeface="Calibri"/>
+              <a:ea typeface="Calibri"/>
+              <a:cs typeface="Calibri"/>
+              <a:sym typeface="Calibri"/>
+            </a:endParaRPr>
+          </a:p>
+        </p:txBody>
+      </p:sp>
+      <p:sp>
+        <p:nvSpPr>
+          <p:cNvPr id="145" name="Shape 145"/>
           <p:cNvSpPr txBox="1">
             <a:spLocks noGrp="1"/>
           </p:cNvSpPr>
@@ -20310,7 +19892,19 @@
                 <a:cs typeface="Calibri"/>
                 <a:sym typeface="Calibri"/>
               </a:rPr>
-              <a:t>SCREEN PROTOTYPES</a:t>
+              <a:t> </a:t>
+            </a:r>
+            <a:r>
+              <a:rPr lang="en-US" sz="2400" b="0" i="0" u="none" strike="noStrike" cap="none" dirty="0" smtClean="0">
+                <a:solidFill>
+                  <a:srgbClr val="EEB211"/>
+                </a:solidFill>
+                <a:latin typeface="Calibri"/>
+                <a:ea typeface="Calibri"/>
+                <a:cs typeface="Calibri"/>
+                <a:sym typeface="Calibri"/>
+              </a:rPr>
+              <a:t>CHALLENGES WE FACED</a:t>
             </a:r>
             <a:endParaRPr lang="en-US" sz="2400" b="0" i="0" u="none" strike="noStrike" cap="none" dirty="0">
               <a:solidFill>
@@ -20324,419 +19918,10 @@
           </a:p>
         </p:txBody>
       </p:sp>
-      <p:pic>
-        <p:nvPicPr>
-          <p:cNvPr id="2" name="Picture 1"/>
-          <p:cNvPicPr>
-            <a:picLocks noChangeAspect="1"/>
-          </p:cNvPicPr>
-          <p:nvPr/>
-        </p:nvPicPr>
-        <p:blipFill>
-          <a:blip r:embed="rId3"/>
-          <a:stretch>
-            <a:fillRect/>
-          </a:stretch>
-        </p:blipFill>
-        <p:spPr>
-          <a:xfrm>
-            <a:off x="1057250" y="999067"/>
-            <a:ext cx="7029497" cy="3626608"/>
-          </a:xfrm>
-          <a:prstGeom prst="rect">
-            <a:avLst/>
-          </a:prstGeom>
-        </p:spPr>
-      </p:pic>
     </p:spTree>
     <p:extLst>
       <p:ext uri="{BB962C8B-B14F-4D97-AF65-F5344CB8AC3E}">
-        <p14:creationId xmlns:p14="http://schemas.microsoft.com/office/powerpoint/2010/main" val="1674117932"/>
-      </p:ext>
-    </p:extLst>
-  </p:cSld>
-  <p:clrMapOvr>
-    <a:masterClrMapping/>
-  </p:clrMapOvr>
-  <p:transition spd="slow">
-    <p:cut/>
-  </p:transition>
-  <p:timing>
-    <p:tnLst>
-      <p:par>
-        <p:cTn id="1" dur="indefinite" restart="never" nodeType="tmRoot"/>
-      </p:par>
-    </p:tnLst>
-  </p:timing>
-</p:sld>
-</file>
-
-<file path=ppt/slides/slide13.xml><?xml version="1.0" encoding="utf-8"?>
-<p:sld xmlns:a="http://schemas.openxmlformats.org/drawingml/2006/main" xmlns:r="http://schemas.openxmlformats.org/officeDocument/2006/relationships" xmlns:p="http://schemas.openxmlformats.org/presentationml/2006/main">
-  <p:cSld>
-    <p:spTree>
-      <p:nvGrpSpPr>
-        <p:cNvPr id="1" name="Shape 131"/>
-        <p:cNvGrpSpPr/>
-        <p:nvPr/>
-      </p:nvGrpSpPr>
-      <p:grpSpPr>
-        <a:xfrm>
-          <a:off x="0" y="0"/>
-          <a:ext cx="0" cy="0"/>
-          <a:chOff x="0" y="0"/>
-          <a:chExt cx="0" cy="0"/>
-        </a:xfrm>
-      </p:grpSpPr>
-      <p:sp>
-        <p:nvSpPr>
-          <p:cNvPr id="132" name="Shape 132"/>
-          <p:cNvSpPr txBox="1">
-            <a:spLocks noGrp="1"/>
-          </p:cNvSpPr>
-          <p:nvPr>
-            <p:ph type="body" idx="1"/>
-          </p:nvPr>
-        </p:nvSpPr>
-        <p:spPr>
-          <a:xfrm>
-            <a:off x="0" y="999067"/>
-            <a:ext cx="9143998" cy="5164664"/>
-          </a:xfrm>
-          <a:prstGeom prst="rect">
-            <a:avLst/>
-          </a:prstGeom>
-          <a:noFill/>
-          <a:ln>
-            <a:noFill/>
-          </a:ln>
-        </p:spPr>
-        <p:txBody>
-          <a:bodyPr lIns="274300" tIns="45700" rIns="274300" bIns="45700" anchor="t" anchorCtr="0">
-            <a:noAutofit/>
-          </a:bodyPr>
-          <a:lstStyle/>
-          <a:p>
-            <a:pPr lvl="1" indent="-288544">
-              <a:spcBef>
-                <a:spcPts val="1020"/>
-              </a:spcBef>
-              <a:spcAft>
-                <a:spcPts val="0"/>
-              </a:spcAft>
-            </a:pPr>
-            <a:endParaRPr lang="en-US" sz="2000" dirty="0" smtClean="0"/>
-          </a:p>
-          <a:p>
-            <a:pPr marL="0" marR="0" lvl="0" indent="0" algn="l" rtl="0">
-              <a:spcBef>
-                <a:spcPts val="1080"/>
-              </a:spcBef>
-              <a:spcAft>
-                <a:spcPts val="0"/>
-              </a:spcAft>
-              <a:buClr>
-                <a:schemeClr val="lt1"/>
-              </a:buClr>
-              <a:buSzPct val="25000"/>
-              <a:buFont typeface="Arial"/>
-              <a:buNone/>
-            </a:pPr>
-            <a:endParaRPr sz="2400" b="0" i="0" u="none" strike="noStrike" cap="none" dirty="0">
-              <a:solidFill>
-                <a:schemeClr val="lt1"/>
-              </a:solidFill>
-              <a:latin typeface="Calibri"/>
-              <a:ea typeface="Calibri"/>
-              <a:cs typeface="Calibri"/>
-              <a:sym typeface="Calibri"/>
-            </a:endParaRPr>
-          </a:p>
-          <a:p>
-            <a:pPr marL="0" marR="0" lvl="0" indent="0" algn="l" rtl="0">
-              <a:spcBef>
-                <a:spcPts val="1080"/>
-              </a:spcBef>
-              <a:spcAft>
-                <a:spcPts val="0"/>
-              </a:spcAft>
-              <a:buClr>
-                <a:schemeClr val="lt1"/>
-              </a:buClr>
-              <a:buSzPct val="25000"/>
-              <a:buFont typeface="Arial"/>
-              <a:buNone/>
-            </a:pPr>
-            <a:endParaRPr sz="2400" b="0" i="0" u="none" strike="noStrike" cap="none" dirty="0">
-              <a:solidFill>
-                <a:schemeClr val="lt1"/>
-              </a:solidFill>
-              <a:latin typeface="Calibri"/>
-              <a:ea typeface="Calibri"/>
-              <a:cs typeface="Calibri"/>
-              <a:sym typeface="Calibri"/>
-            </a:endParaRPr>
-          </a:p>
-          <a:p>
-            <a:pPr marL="0" marR="0" lvl="0" indent="0" algn="l" rtl="0">
-              <a:spcBef>
-                <a:spcPts val="1080"/>
-              </a:spcBef>
-              <a:spcAft>
-                <a:spcPts val="0"/>
-              </a:spcAft>
-              <a:buClr>
-                <a:schemeClr val="lt1"/>
-              </a:buClr>
-              <a:buSzPct val="25000"/>
-              <a:buFont typeface="Arial"/>
-              <a:buNone/>
-            </a:pPr>
-            <a:endParaRPr sz="2400" b="0" i="0" u="none" strike="noStrike" cap="none" dirty="0">
-              <a:solidFill>
-                <a:schemeClr val="lt1"/>
-              </a:solidFill>
-              <a:latin typeface="Calibri"/>
-              <a:ea typeface="Calibri"/>
-              <a:cs typeface="Calibri"/>
-              <a:sym typeface="Calibri"/>
-            </a:endParaRPr>
-          </a:p>
-          <a:p>
-            <a:pPr marL="0" marR="0" lvl="0" indent="0" algn="l" rtl="0">
-              <a:spcBef>
-                <a:spcPts val="1080"/>
-              </a:spcBef>
-              <a:spcAft>
-                <a:spcPts val="0"/>
-              </a:spcAft>
-              <a:buClr>
-                <a:schemeClr val="lt1"/>
-              </a:buClr>
-              <a:buSzPct val="25000"/>
-              <a:buFont typeface="Arial"/>
-              <a:buNone/>
-            </a:pPr>
-            <a:endParaRPr sz="2400" b="0" i="0" u="none" strike="noStrike" cap="none" dirty="0">
-              <a:solidFill>
-                <a:schemeClr val="lt1"/>
-              </a:solidFill>
-              <a:latin typeface="Calibri"/>
-              <a:ea typeface="Calibri"/>
-              <a:cs typeface="Calibri"/>
-              <a:sym typeface="Calibri"/>
-            </a:endParaRPr>
-          </a:p>
-          <a:p>
-            <a:pPr marL="0" marR="0" lvl="0" indent="0" algn="l" rtl="0">
-              <a:spcBef>
-                <a:spcPts val="1080"/>
-              </a:spcBef>
-              <a:spcAft>
-                <a:spcPts val="0"/>
-              </a:spcAft>
-              <a:buClr>
-                <a:schemeClr val="lt1"/>
-              </a:buClr>
-              <a:buSzPct val="25000"/>
-              <a:buFont typeface="Arial"/>
-              <a:buNone/>
-            </a:pPr>
-            <a:endParaRPr lang="en-US" sz="2400" b="0" i="0" u="none" strike="noStrike" cap="none" dirty="0" smtClean="0">
-              <a:solidFill>
-                <a:schemeClr val="lt1"/>
-              </a:solidFill>
-              <a:latin typeface="Calibri"/>
-              <a:ea typeface="Calibri"/>
-              <a:cs typeface="Calibri"/>
-              <a:sym typeface="Calibri"/>
-            </a:endParaRPr>
-          </a:p>
-          <a:p>
-            <a:pPr marL="0" marR="0" lvl="0" indent="0" algn="l" rtl="0">
-              <a:spcBef>
-                <a:spcPts val="1080"/>
-              </a:spcBef>
-              <a:spcAft>
-                <a:spcPts val="0"/>
-              </a:spcAft>
-              <a:buClr>
-                <a:schemeClr val="lt1"/>
-              </a:buClr>
-              <a:buSzPct val="25000"/>
-              <a:buFont typeface="Arial"/>
-              <a:buNone/>
-            </a:pPr>
-            <a:endParaRPr lang="en-US" dirty="0"/>
-          </a:p>
-          <a:p>
-            <a:pPr marL="0" marR="0" lvl="0" indent="0" algn="l" rtl="0">
-              <a:spcBef>
-                <a:spcPts val="1080"/>
-              </a:spcBef>
-              <a:spcAft>
-                <a:spcPts val="0"/>
-              </a:spcAft>
-              <a:buClr>
-                <a:schemeClr val="lt1"/>
-              </a:buClr>
-              <a:buSzPct val="25000"/>
-              <a:buFont typeface="Arial"/>
-              <a:buNone/>
-            </a:pPr>
-            <a:endParaRPr lang="en-US" sz="2400" b="0" i="0" u="none" strike="noStrike" cap="none" dirty="0" smtClean="0">
-              <a:solidFill>
-                <a:schemeClr val="lt1"/>
-              </a:solidFill>
-              <a:latin typeface="Calibri"/>
-              <a:ea typeface="Calibri"/>
-              <a:cs typeface="Calibri"/>
-              <a:sym typeface="Calibri"/>
-            </a:endParaRPr>
-          </a:p>
-          <a:p>
-            <a:pPr marL="0" marR="0" lvl="0" indent="0" algn="l" rtl="0">
-              <a:spcBef>
-                <a:spcPts val="1080"/>
-              </a:spcBef>
-              <a:spcAft>
-                <a:spcPts val="0"/>
-              </a:spcAft>
-              <a:buClr>
-                <a:schemeClr val="lt1"/>
-              </a:buClr>
-              <a:buSzPct val="25000"/>
-              <a:buFont typeface="Arial"/>
-              <a:buNone/>
-            </a:pPr>
-            <a:r>
-              <a:rPr lang="en-US" sz="1800" b="0" i="0" u="none" strike="noStrike" cap="none" dirty="0" smtClean="0">
-                <a:solidFill>
-                  <a:schemeClr val="lt1"/>
-                </a:solidFill>
-                <a:latin typeface="Calibri"/>
-                <a:ea typeface="Calibri"/>
-                <a:cs typeface="Calibri"/>
-                <a:sym typeface="Calibri"/>
-              </a:rPr>
-              <a:t>After clicking the Profile, the following screen shows up. The user can enter/edit her user profile info, including Name, Sex, email address and password. </a:t>
-            </a:r>
-            <a:endParaRPr sz="1800" b="0" i="0" u="none" strike="noStrike" cap="none" dirty="0">
-              <a:solidFill>
-                <a:schemeClr val="lt1"/>
-              </a:solidFill>
-              <a:latin typeface="Calibri"/>
-              <a:ea typeface="Calibri"/>
-              <a:cs typeface="Calibri"/>
-              <a:sym typeface="Calibri"/>
-            </a:endParaRPr>
-          </a:p>
-        </p:txBody>
-      </p:sp>
-      <p:sp>
-        <p:nvSpPr>
-          <p:cNvPr id="133" name="Shape 133"/>
-          <p:cNvSpPr txBox="1">
-            <a:spLocks noGrp="1"/>
-          </p:cNvSpPr>
-          <p:nvPr>
-            <p:ph type="title"/>
-          </p:nvPr>
-        </p:nvSpPr>
-        <p:spPr>
-          <a:xfrm>
-            <a:off x="0" y="0"/>
-            <a:ext cx="9144000" cy="991351"/>
-          </a:xfrm>
-          <a:prstGeom prst="rect">
-            <a:avLst/>
-          </a:prstGeom>
-          <a:noFill/>
-          <a:ln>
-            <a:noFill/>
-          </a:ln>
-        </p:spPr>
-        <p:txBody>
-          <a:bodyPr lIns="274300" tIns="45700" rIns="91425" bIns="45700" anchor="ctr" anchorCtr="0">
-            <a:noAutofit/>
-          </a:bodyPr>
-          <a:lstStyle/>
-          <a:p>
-            <a:pPr marL="0" marR="0" lvl="0" indent="0" algn="l" rtl="0">
-              <a:spcBef>
-                <a:spcPts val="0"/>
-              </a:spcBef>
-              <a:buClr>
-                <a:srgbClr val="EEB211"/>
-              </a:buClr>
-              <a:buSzPct val="25000"/>
-              <a:buFont typeface="Calibri"/>
-              <a:buNone/>
-            </a:pPr>
-            <a:r>
-              <a:rPr lang="en-US" sz="2400" b="0" i="0" u="none" strike="noStrike" cap="none" dirty="0">
-                <a:solidFill>
-                  <a:srgbClr val="EEB211"/>
-                </a:solidFill>
-                <a:latin typeface="Calibri"/>
-                <a:ea typeface="Calibri"/>
-                <a:cs typeface="Calibri"/>
-                <a:sym typeface="Calibri"/>
-              </a:rPr>
-              <a:t> 			</a:t>
-            </a:r>
-            <a:r>
-              <a:rPr lang="en-US" sz="2400" b="0" i="0" u="none" strike="noStrike" cap="none" dirty="0" smtClean="0">
-                <a:solidFill>
-                  <a:srgbClr val="EEB211"/>
-                </a:solidFill>
-                <a:latin typeface="Calibri"/>
-                <a:ea typeface="Calibri"/>
-                <a:cs typeface="Calibri"/>
-                <a:sym typeface="Calibri"/>
-              </a:rPr>
-              <a:t>SCREEN PROTOTYPES</a:t>
-            </a:r>
-            <a:endParaRPr lang="en-US" sz="2400" b="0" i="0" u="none" strike="noStrike" cap="none" dirty="0">
-              <a:solidFill>
-                <a:srgbClr val="EEB211"/>
-              </a:solidFill>
-              <a:latin typeface="Calibri"/>
-              <a:ea typeface="Calibri"/>
-              <a:cs typeface="Calibri"/>
-              <a:sym typeface="Calibri"/>
-            </a:endParaRPr>
-          </a:p>
-        </p:txBody>
-      </p:sp>
-      <p:pic>
-        <p:nvPicPr>
-          <p:cNvPr id="2" name="Picture 1"/>
-          <p:cNvPicPr>
-            <a:picLocks noChangeAspect="1"/>
-          </p:cNvPicPr>
-          <p:nvPr/>
-        </p:nvPicPr>
-        <p:blipFill>
-          <a:blip r:embed="rId3"/>
-          <a:stretch>
-            <a:fillRect/>
-          </a:stretch>
-        </p:blipFill>
-        <p:spPr>
-          <a:xfrm>
-            <a:off x="1460595" y="999067"/>
-            <a:ext cx="5676900" cy="3171825"/>
-          </a:xfrm>
-          <a:prstGeom prst="rect">
-            <a:avLst/>
-          </a:prstGeom>
-        </p:spPr>
-      </p:pic>
-    </p:spTree>
-    <p:extLst>
-      <p:ext uri="{BB962C8B-B14F-4D97-AF65-F5344CB8AC3E}">
-        <p14:creationId xmlns:p14="http://schemas.microsoft.com/office/powerpoint/2010/main" val="126597179"/>
+        <p14:creationId xmlns:p14="http://schemas.microsoft.com/office/powerpoint/2010/main" val="2361553802"/>
       </p:ext>
     </p:extLst>
   </p:cSld>
@@ -20802,806 +19987,6 @@
           </a:bodyPr>
           <a:lstStyle/>
           <a:p>
-            <a:pPr marL="342900" indent="-342900">
-              <a:spcBef>
-                <a:spcPts val="1080"/>
-              </a:spcBef>
-              <a:spcAft>
-                <a:spcPts val="0"/>
-              </a:spcAft>
-              <a:buSzPct val="25000"/>
-              <a:buFont typeface="Arial" panose="020B0604020202020204" pitchFamily="34" charset="0"/>
-              <a:buChar char="•"/>
-            </a:pPr>
-            <a:r>
-              <a:rPr lang="en-US" dirty="0">
-                <a:solidFill>
-                  <a:schemeClr val="bg1"/>
-                </a:solidFill>
-              </a:rPr>
-              <a:t>FHIR integration for our user vaccinations </a:t>
-            </a:r>
-            <a:r>
-              <a:rPr lang="en-US" dirty="0" smtClean="0">
-                <a:solidFill>
-                  <a:schemeClr val="bg1"/>
-                </a:solidFill>
-              </a:rPr>
-              <a:t>feature</a:t>
-            </a:r>
-          </a:p>
-          <a:p>
-            <a:pPr marL="342900" indent="-342900">
-              <a:spcBef>
-                <a:spcPts val="1080"/>
-              </a:spcBef>
-              <a:spcAft>
-                <a:spcPts val="0"/>
-              </a:spcAft>
-              <a:buSzPct val="25000"/>
-              <a:buFont typeface="Arial" panose="020B0604020202020204" pitchFamily="34" charset="0"/>
-              <a:buChar char="•"/>
-            </a:pPr>
-            <a:endParaRPr lang="en-US" sz="2400" b="0" i="0" u="none" strike="noStrike" cap="none" dirty="0">
-              <a:solidFill>
-                <a:schemeClr val="bg1"/>
-              </a:solidFill>
-              <a:latin typeface="Calibri"/>
-              <a:ea typeface="Calibri"/>
-              <a:cs typeface="Calibri"/>
-              <a:sym typeface="Calibri"/>
-            </a:endParaRPr>
-          </a:p>
-          <a:p>
-            <a:pPr marL="342900" indent="-342900">
-              <a:spcBef>
-                <a:spcPts val="1080"/>
-              </a:spcBef>
-              <a:spcAft>
-                <a:spcPts val="0"/>
-              </a:spcAft>
-              <a:buSzPct val="25000"/>
-              <a:buFont typeface="Arial" panose="020B0604020202020204" pitchFamily="34" charset="0"/>
-              <a:buChar char="•"/>
-            </a:pPr>
-            <a:r>
-              <a:rPr lang="en-US" dirty="0" smtClean="0">
-                <a:solidFill>
-                  <a:schemeClr val="bg1"/>
-                </a:solidFill>
-              </a:rPr>
-              <a:t>Implementation and Testing of Disease to vaccination and medical mapping feature.</a:t>
-            </a:r>
-          </a:p>
-          <a:p>
-            <a:pPr marL="342900" indent="-342900">
-              <a:spcBef>
-                <a:spcPts val="1080"/>
-              </a:spcBef>
-              <a:spcAft>
-                <a:spcPts val="0"/>
-              </a:spcAft>
-              <a:buSzPct val="25000"/>
-              <a:buFont typeface="Arial" panose="020B0604020202020204" pitchFamily="34" charset="0"/>
-              <a:buChar char="•"/>
-            </a:pPr>
-            <a:endParaRPr lang="en-US" sz="2400" b="0" i="0" u="none" strike="noStrike" cap="none" dirty="0">
-              <a:solidFill>
-                <a:schemeClr val="bg1"/>
-              </a:solidFill>
-              <a:latin typeface="Calibri"/>
-              <a:ea typeface="Calibri"/>
-              <a:cs typeface="Calibri"/>
-              <a:sym typeface="Calibri"/>
-            </a:endParaRPr>
-          </a:p>
-          <a:p>
-            <a:pPr marL="342900" indent="-342900">
-              <a:spcBef>
-                <a:spcPts val="1080"/>
-              </a:spcBef>
-              <a:spcAft>
-                <a:spcPts val="0"/>
-              </a:spcAft>
-              <a:buSzPct val="25000"/>
-              <a:buFont typeface="Arial" panose="020B0604020202020204" pitchFamily="34" charset="0"/>
-              <a:buChar char="•"/>
-            </a:pPr>
-            <a:r>
-              <a:rPr lang="en-US" dirty="0" smtClean="0">
-                <a:solidFill>
-                  <a:schemeClr val="bg1"/>
-                </a:solidFill>
-              </a:rPr>
-              <a:t>Testing of email notification feature</a:t>
-            </a:r>
-          </a:p>
-          <a:p>
-            <a:pPr marL="342900" indent="-342900">
-              <a:spcBef>
-                <a:spcPts val="1080"/>
-              </a:spcBef>
-              <a:spcAft>
-                <a:spcPts val="0"/>
-              </a:spcAft>
-              <a:buSzPct val="25000"/>
-              <a:buFont typeface="Arial" panose="020B0604020202020204" pitchFamily="34" charset="0"/>
-              <a:buChar char="•"/>
-            </a:pPr>
-            <a:endParaRPr lang="en-US" sz="2400" b="0" i="0" u="none" strike="noStrike" cap="none" dirty="0">
-              <a:solidFill>
-                <a:schemeClr val="bg1"/>
-              </a:solidFill>
-              <a:latin typeface="Calibri"/>
-              <a:ea typeface="Calibri"/>
-              <a:cs typeface="Calibri"/>
-              <a:sym typeface="Calibri"/>
-            </a:endParaRPr>
-          </a:p>
-          <a:p>
-            <a:pPr marL="342900" indent="-342900">
-              <a:spcBef>
-                <a:spcPts val="1080"/>
-              </a:spcBef>
-              <a:spcAft>
-                <a:spcPts val="0"/>
-              </a:spcAft>
-              <a:buSzPct val="25000"/>
-              <a:buFont typeface="Arial" panose="020B0604020202020204" pitchFamily="34" charset="0"/>
-              <a:buChar char="•"/>
-            </a:pPr>
-            <a:r>
-              <a:rPr lang="en-US" dirty="0" smtClean="0">
-                <a:solidFill>
-                  <a:schemeClr val="bg1"/>
-                </a:solidFill>
-              </a:rPr>
-              <a:t>End to End Testing, community demo and feedback gathering.</a:t>
-            </a:r>
-            <a:endParaRPr sz="2400" b="0" i="0" u="none" strike="noStrike" cap="none" dirty="0">
-              <a:solidFill>
-                <a:schemeClr val="lt1"/>
-              </a:solidFill>
-              <a:latin typeface="Calibri"/>
-              <a:ea typeface="Calibri"/>
-              <a:cs typeface="Calibri"/>
-              <a:sym typeface="Calibri"/>
-            </a:endParaRPr>
-          </a:p>
-        </p:txBody>
-      </p:sp>
-      <p:sp>
-        <p:nvSpPr>
-          <p:cNvPr id="133" name="Shape 133"/>
-          <p:cNvSpPr txBox="1">
-            <a:spLocks noGrp="1"/>
-          </p:cNvSpPr>
-          <p:nvPr>
-            <p:ph type="title"/>
-          </p:nvPr>
-        </p:nvSpPr>
-        <p:spPr>
-          <a:xfrm>
-            <a:off x="0" y="0"/>
-            <a:ext cx="9144000" cy="991351"/>
-          </a:xfrm>
-          <a:prstGeom prst="rect">
-            <a:avLst/>
-          </a:prstGeom>
-          <a:noFill/>
-          <a:ln>
-            <a:noFill/>
-          </a:ln>
-        </p:spPr>
-        <p:txBody>
-          <a:bodyPr lIns="274300" tIns="45700" rIns="91425" bIns="45700" anchor="ctr" anchorCtr="0">
-            <a:noAutofit/>
-          </a:bodyPr>
-          <a:lstStyle/>
-          <a:p>
-            <a:pPr marL="0" marR="0" lvl="0" indent="0" algn="l" rtl="0">
-              <a:spcBef>
-                <a:spcPts val="0"/>
-              </a:spcBef>
-              <a:buClr>
-                <a:srgbClr val="EEB211"/>
-              </a:buClr>
-              <a:buSzPct val="25000"/>
-              <a:buFont typeface="Calibri"/>
-              <a:buNone/>
-            </a:pPr>
-            <a:r>
-              <a:rPr lang="en-US" sz="2400" b="0" i="0" u="none" strike="noStrike" cap="none" dirty="0">
-                <a:solidFill>
-                  <a:srgbClr val="EEB211"/>
-                </a:solidFill>
-                <a:latin typeface="Calibri"/>
-                <a:ea typeface="Calibri"/>
-                <a:cs typeface="Calibri"/>
-                <a:sym typeface="Calibri"/>
-              </a:rPr>
-              <a:t> 		</a:t>
-            </a:r>
-            <a:r>
-              <a:rPr lang="en-US" sz="2400" b="0" i="0" u="none" strike="noStrike" cap="none" dirty="0" smtClean="0">
-                <a:solidFill>
-                  <a:srgbClr val="EEB211"/>
-                </a:solidFill>
-                <a:latin typeface="Calibri"/>
-                <a:ea typeface="Calibri"/>
-                <a:cs typeface="Calibri"/>
-                <a:sym typeface="Calibri"/>
-              </a:rPr>
-              <a:t>OUTSTANDING ELEMENTS OF APPLICATION</a:t>
-            </a:r>
-            <a:endParaRPr lang="en-US" sz="2400" b="0" i="0" u="none" strike="noStrike" cap="none" dirty="0">
-              <a:solidFill>
-                <a:srgbClr val="EEB211"/>
-              </a:solidFill>
-              <a:latin typeface="Calibri"/>
-              <a:ea typeface="Calibri"/>
-              <a:cs typeface="Calibri"/>
-              <a:sym typeface="Calibri"/>
-            </a:endParaRPr>
-          </a:p>
-        </p:txBody>
-      </p:sp>
-    </p:spTree>
-    <p:extLst>
-      <p:ext uri="{BB962C8B-B14F-4D97-AF65-F5344CB8AC3E}">
-        <p14:creationId xmlns:p14="http://schemas.microsoft.com/office/powerpoint/2010/main" val="260339633"/>
-      </p:ext>
-    </p:extLst>
-  </p:cSld>
-  <p:clrMapOvr>
-    <a:masterClrMapping/>
-  </p:clrMapOvr>
-  <p:transition spd="slow">
-    <p:cut/>
-  </p:transition>
-  <p:timing>
-    <p:tnLst>
-      <p:par>
-        <p:cTn id="1" dur="indefinite" restart="never" nodeType="tmRoot"/>
-      </p:par>
-    </p:tnLst>
-  </p:timing>
-</p:sld>
-</file>
-
-<file path=ppt/slides/slide15.xml><?xml version="1.0" encoding="utf-8"?>
-<p:sld xmlns:a="http://schemas.openxmlformats.org/drawingml/2006/main" xmlns:r="http://schemas.openxmlformats.org/officeDocument/2006/relationships" xmlns:p="http://schemas.openxmlformats.org/presentationml/2006/main">
-  <p:cSld>
-    <p:spTree>
-      <p:nvGrpSpPr>
-        <p:cNvPr id="1" name="Shape 143"/>
-        <p:cNvGrpSpPr/>
-        <p:nvPr/>
-      </p:nvGrpSpPr>
-      <p:grpSpPr>
-        <a:xfrm>
-          <a:off x="0" y="0"/>
-          <a:ext cx="0" cy="0"/>
-          <a:chOff x="0" y="0"/>
-          <a:chExt cx="0" cy="0"/>
-        </a:xfrm>
-      </p:grpSpPr>
-      <p:sp>
-        <p:nvSpPr>
-          <p:cNvPr id="144" name="Shape 144"/>
-          <p:cNvSpPr txBox="1">
-            <a:spLocks noGrp="1"/>
-          </p:cNvSpPr>
-          <p:nvPr>
-            <p:ph type="body" idx="1"/>
-          </p:nvPr>
-        </p:nvSpPr>
-        <p:spPr>
-          <a:xfrm>
-            <a:off x="0" y="999067"/>
-            <a:ext cx="9143998" cy="5164664"/>
-          </a:xfrm>
-          <a:prstGeom prst="rect">
-            <a:avLst/>
-          </a:prstGeom>
-          <a:noFill/>
-          <a:ln>
-            <a:noFill/>
-          </a:ln>
-        </p:spPr>
-        <p:txBody>
-          <a:bodyPr lIns="274300" tIns="45700" rIns="274300" bIns="45700" anchor="t" anchorCtr="0">
-            <a:noAutofit/>
-          </a:bodyPr>
-          <a:lstStyle/>
-          <a:p>
-            <a:pPr marL="0" marR="0" lvl="0" indent="0" algn="l" rtl="0">
-              <a:spcBef>
-                <a:spcPts val="1080"/>
-              </a:spcBef>
-              <a:spcAft>
-                <a:spcPts val="0"/>
-              </a:spcAft>
-              <a:buClr>
-                <a:schemeClr val="lt1"/>
-              </a:buClr>
-              <a:buSzPct val="25000"/>
-              <a:buFont typeface="Arial"/>
-              <a:buNone/>
-            </a:pPr>
-            <a:endParaRPr sz="2400" b="0" i="0" u="none" strike="noStrike" cap="none" dirty="0">
-              <a:solidFill>
-                <a:schemeClr val="lt1"/>
-              </a:solidFill>
-              <a:latin typeface="Calibri"/>
-              <a:ea typeface="Calibri"/>
-              <a:cs typeface="Calibri"/>
-              <a:sym typeface="Calibri"/>
-            </a:endParaRPr>
-          </a:p>
-          <a:p>
-            <a:r>
-              <a:rPr lang="en-US" dirty="0" smtClean="0"/>
-              <a:t>Integrating </a:t>
-            </a:r>
-            <a:r>
-              <a:rPr lang="en-US" dirty="0"/>
-              <a:t>and authenticating with the FHIR server:  We ultimately decided to create new FHIR users when a user account is created on safe-travels. We then can sync vaccine data from our application with FHIR. We also had to map all our CDC vaccine names to vaccine codes that are usable with FHIR.</a:t>
-            </a:r>
-          </a:p>
-          <a:p>
-            <a:r>
-              <a:rPr lang="en-US" dirty="0"/>
-              <a:t> </a:t>
-            </a:r>
-          </a:p>
-          <a:p>
-            <a:r>
-              <a:rPr lang="en-US" dirty="0"/>
-              <a:t>Email Integration:  We had some difficulty finding an email provider to integrate our application with.  After hitting some dead ends, we decided to go with SendGrid which provided an easy-to-use Java API.</a:t>
-            </a:r>
-          </a:p>
-          <a:p>
-            <a:r>
-              <a:rPr lang="en-US" dirty="0"/>
-              <a:t> </a:t>
-            </a:r>
-          </a:p>
-          <a:p>
-            <a:pPr marL="0" marR="0" lvl="0" indent="0" algn="l" rtl="0">
-              <a:spcBef>
-                <a:spcPts val="1080"/>
-              </a:spcBef>
-              <a:spcAft>
-                <a:spcPts val="0"/>
-              </a:spcAft>
-              <a:buClr>
-                <a:schemeClr val="lt1"/>
-              </a:buClr>
-              <a:buSzPct val="25000"/>
-              <a:buFont typeface="Arial"/>
-              <a:buNone/>
-            </a:pPr>
-            <a:endParaRPr sz="2400" b="0" i="0" u="none" strike="noStrike" cap="none" dirty="0">
-              <a:solidFill>
-                <a:schemeClr val="lt1"/>
-              </a:solidFill>
-              <a:latin typeface="Calibri"/>
-              <a:ea typeface="Calibri"/>
-              <a:cs typeface="Calibri"/>
-              <a:sym typeface="Calibri"/>
-            </a:endParaRPr>
-          </a:p>
-        </p:txBody>
-      </p:sp>
-      <p:sp>
-        <p:nvSpPr>
-          <p:cNvPr id="145" name="Shape 145"/>
-          <p:cNvSpPr txBox="1">
-            <a:spLocks noGrp="1"/>
-          </p:cNvSpPr>
-          <p:nvPr>
-            <p:ph type="title"/>
-          </p:nvPr>
-        </p:nvSpPr>
-        <p:spPr>
-          <a:xfrm>
-            <a:off x="0" y="0"/>
-            <a:ext cx="9144000" cy="991351"/>
-          </a:xfrm>
-          <a:prstGeom prst="rect">
-            <a:avLst/>
-          </a:prstGeom>
-          <a:noFill/>
-          <a:ln>
-            <a:noFill/>
-          </a:ln>
-        </p:spPr>
-        <p:txBody>
-          <a:bodyPr lIns="274300" tIns="45700" rIns="91425" bIns="45700" anchor="ctr" anchorCtr="0">
-            <a:noAutofit/>
-          </a:bodyPr>
-          <a:lstStyle/>
-          <a:p>
-            <a:pPr marL="0" marR="0" lvl="0" indent="0" algn="l" rtl="0">
-              <a:spcBef>
-                <a:spcPts val="0"/>
-              </a:spcBef>
-              <a:buClr>
-                <a:srgbClr val="EEB211"/>
-              </a:buClr>
-              <a:buSzPct val="25000"/>
-              <a:buFont typeface="Calibri"/>
-              <a:buNone/>
-            </a:pPr>
-            <a:r>
-              <a:rPr lang="en-US" sz="2400" b="0" i="0" u="none" strike="noStrike" cap="none" dirty="0">
-                <a:solidFill>
-                  <a:srgbClr val="EEB211"/>
-                </a:solidFill>
-                <a:latin typeface="Calibri"/>
-                <a:ea typeface="Calibri"/>
-                <a:cs typeface="Calibri"/>
-                <a:sym typeface="Calibri"/>
-              </a:rPr>
-              <a:t> 			</a:t>
-            </a:r>
-            <a:r>
-              <a:rPr lang="en-US" sz="2400" b="0" i="0" u="none" strike="noStrike" cap="none" dirty="0" smtClean="0">
-                <a:solidFill>
-                  <a:srgbClr val="EEB211"/>
-                </a:solidFill>
-                <a:latin typeface="Calibri"/>
-                <a:ea typeface="Calibri"/>
-                <a:cs typeface="Calibri"/>
-                <a:sym typeface="Calibri"/>
-              </a:rPr>
-              <a:t> CHALLENGES</a:t>
-            </a:r>
-            <a:endParaRPr lang="en-US" sz="2400" b="0" i="0" u="none" strike="noStrike" cap="none" dirty="0">
-              <a:solidFill>
-                <a:srgbClr val="EEB211"/>
-              </a:solidFill>
-              <a:latin typeface="Calibri"/>
-              <a:ea typeface="Calibri"/>
-              <a:cs typeface="Calibri"/>
-              <a:sym typeface="Calibri"/>
-            </a:endParaRPr>
-          </a:p>
-        </p:txBody>
-      </p:sp>
-    </p:spTree>
-  </p:cSld>
-  <p:clrMapOvr>
-    <a:masterClrMapping/>
-  </p:clrMapOvr>
-  <p:transition spd="slow">
-    <p:cut/>
-  </p:transition>
-  <p:timing>
-    <p:tnLst>
-      <p:par>
-        <p:cTn id="1" dur="indefinite" restart="never" nodeType="tmRoot"/>
-      </p:par>
-    </p:tnLst>
-  </p:timing>
-</p:sld>
-</file>
-
-<file path=ppt/slides/slide16.xml><?xml version="1.0" encoding="utf-8"?>
-<p:sld xmlns:a="http://schemas.openxmlformats.org/drawingml/2006/main" xmlns:r="http://schemas.openxmlformats.org/officeDocument/2006/relationships" xmlns:p="http://schemas.openxmlformats.org/presentationml/2006/main">
-  <p:cSld>
-    <p:spTree>
-      <p:nvGrpSpPr>
-        <p:cNvPr id="1" name="Shape 143"/>
-        <p:cNvGrpSpPr/>
-        <p:nvPr/>
-      </p:nvGrpSpPr>
-      <p:grpSpPr>
-        <a:xfrm>
-          <a:off x="0" y="0"/>
-          <a:ext cx="0" cy="0"/>
-          <a:chOff x="0" y="0"/>
-          <a:chExt cx="0" cy="0"/>
-        </a:xfrm>
-      </p:grpSpPr>
-      <p:sp>
-        <p:nvSpPr>
-          <p:cNvPr id="144" name="Shape 144"/>
-          <p:cNvSpPr txBox="1">
-            <a:spLocks noGrp="1"/>
-          </p:cNvSpPr>
-          <p:nvPr>
-            <p:ph type="body" idx="1"/>
-          </p:nvPr>
-        </p:nvSpPr>
-        <p:spPr>
-          <a:xfrm>
-            <a:off x="0" y="999067"/>
-            <a:ext cx="9143998" cy="5164664"/>
-          </a:xfrm>
-          <a:prstGeom prst="rect">
-            <a:avLst/>
-          </a:prstGeom>
-          <a:noFill/>
-          <a:ln>
-            <a:noFill/>
-          </a:ln>
-        </p:spPr>
-        <p:txBody>
-          <a:bodyPr lIns="274300" tIns="45700" rIns="274300" bIns="45700" anchor="t" anchorCtr="0">
-            <a:noAutofit/>
-          </a:bodyPr>
-          <a:lstStyle/>
-          <a:p>
-            <a:pPr marL="0" marR="0" lvl="0" indent="0" algn="l" rtl="0">
-              <a:spcBef>
-                <a:spcPts val="1080"/>
-              </a:spcBef>
-              <a:spcAft>
-                <a:spcPts val="0"/>
-              </a:spcAft>
-              <a:buClr>
-                <a:schemeClr val="lt1"/>
-              </a:buClr>
-              <a:buSzPct val="25000"/>
-              <a:buFont typeface="Arial"/>
-              <a:buNone/>
-            </a:pPr>
-            <a:endParaRPr sz="2400" b="0" i="0" u="none" strike="noStrike" cap="none" dirty="0">
-              <a:solidFill>
-                <a:schemeClr val="lt1"/>
-              </a:solidFill>
-              <a:latin typeface="Calibri"/>
-              <a:ea typeface="Calibri"/>
-              <a:cs typeface="Calibri"/>
-              <a:sym typeface="Calibri"/>
-            </a:endParaRPr>
-          </a:p>
-          <a:p>
-            <a:r>
-              <a:rPr lang="en-US" dirty="0" smtClean="0"/>
-              <a:t>UI </a:t>
-            </a:r>
-            <a:r>
-              <a:rPr lang="en-US" dirty="0"/>
-              <a:t>Challenges:  We had various UI challenges, specifically figuring out how to display CDC alerts and how to allow users to mark off vaccinations as current.</a:t>
-            </a:r>
-          </a:p>
-          <a:p>
-            <a:pPr marL="0" marR="0" lvl="0" indent="0" algn="l" rtl="0">
-              <a:spcBef>
-                <a:spcPts val="1080"/>
-              </a:spcBef>
-              <a:spcAft>
-                <a:spcPts val="0"/>
-              </a:spcAft>
-              <a:buClr>
-                <a:schemeClr val="lt1"/>
-              </a:buClr>
-              <a:buSzPct val="25000"/>
-              <a:buFont typeface="Arial"/>
-              <a:buNone/>
-            </a:pPr>
-            <a:endParaRPr sz="2400" b="0" i="0" u="none" strike="noStrike" cap="none" dirty="0">
-              <a:solidFill>
-                <a:schemeClr val="lt1"/>
-              </a:solidFill>
-              <a:latin typeface="Calibri"/>
-              <a:ea typeface="Calibri"/>
-              <a:cs typeface="Calibri"/>
-              <a:sym typeface="Calibri"/>
-            </a:endParaRPr>
-          </a:p>
-          <a:p>
-            <a:pPr marL="0" marR="0" lvl="0" indent="0" algn="l" rtl="0">
-              <a:spcBef>
-                <a:spcPts val="1080"/>
-              </a:spcBef>
-              <a:spcAft>
-                <a:spcPts val="0"/>
-              </a:spcAft>
-              <a:buClr>
-                <a:schemeClr val="lt1"/>
-              </a:buClr>
-              <a:buSzPct val="25000"/>
-              <a:buFont typeface="Arial"/>
-              <a:buNone/>
-            </a:pPr>
-            <a:endParaRPr sz="2400" b="0" i="0" u="none" strike="noStrike" cap="none" dirty="0">
-              <a:solidFill>
-                <a:schemeClr val="lt1"/>
-              </a:solidFill>
-              <a:latin typeface="Calibri"/>
-              <a:ea typeface="Calibri"/>
-              <a:cs typeface="Calibri"/>
-              <a:sym typeface="Calibri"/>
-            </a:endParaRPr>
-          </a:p>
-          <a:p>
-            <a:pPr marL="0" marR="0" lvl="0" indent="0" algn="l" rtl="0">
-              <a:spcBef>
-                <a:spcPts val="1080"/>
-              </a:spcBef>
-              <a:spcAft>
-                <a:spcPts val="0"/>
-              </a:spcAft>
-              <a:buClr>
-                <a:schemeClr val="lt1"/>
-              </a:buClr>
-              <a:buSzPct val="25000"/>
-              <a:buFont typeface="Arial"/>
-              <a:buNone/>
-            </a:pPr>
-            <a:endParaRPr sz="2400" b="0" i="0" u="none" strike="noStrike" cap="none" dirty="0">
-              <a:solidFill>
-                <a:schemeClr val="lt1"/>
-              </a:solidFill>
-              <a:latin typeface="Calibri"/>
-              <a:ea typeface="Calibri"/>
-              <a:cs typeface="Calibri"/>
-              <a:sym typeface="Calibri"/>
-            </a:endParaRPr>
-          </a:p>
-        </p:txBody>
-      </p:sp>
-      <p:sp>
-        <p:nvSpPr>
-          <p:cNvPr id="145" name="Shape 145"/>
-          <p:cNvSpPr txBox="1">
-            <a:spLocks noGrp="1"/>
-          </p:cNvSpPr>
-          <p:nvPr>
-            <p:ph type="title"/>
-          </p:nvPr>
-        </p:nvSpPr>
-        <p:spPr>
-          <a:xfrm>
-            <a:off x="0" y="0"/>
-            <a:ext cx="9144000" cy="991351"/>
-          </a:xfrm>
-          <a:prstGeom prst="rect">
-            <a:avLst/>
-          </a:prstGeom>
-          <a:noFill/>
-          <a:ln>
-            <a:noFill/>
-          </a:ln>
-        </p:spPr>
-        <p:txBody>
-          <a:bodyPr lIns="274300" tIns="45700" rIns="91425" bIns="45700" anchor="ctr" anchorCtr="0">
-            <a:noAutofit/>
-          </a:bodyPr>
-          <a:lstStyle/>
-          <a:p>
-            <a:pPr marL="0" marR="0" lvl="0" indent="0" algn="l" rtl="0">
-              <a:spcBef>
-                <a:spcPts val="0"/>
-              </a:spcBef>
-              <a:buClr>
-                <a:srgbClr val="EEB211"/>
-              </a:buClr>
-              <a:buSzPct val="25000"/>
-              <a:buFont typeface="Calibri"/>
-              <a:buNone/>
-            </a:pPr>
-            <a:r>
-              <a:rPr lang="en-US" sz="2400" b="0" i="0" u="none" strike="noStrike" cap="none" dirty="0">
-                <a:solidFill>
-                  <a:srgbClr val="EEB211"/>
-                </a:solidFill>
-                <a:latin typeface="Calibri"/>
-                <a:ea typeface="Calibri"/>
-                <a:cs typeface="Calibri"/>
-                <a:sym typeface="Calibri"/>
-              </a:rPr>
-              <a:t> 			</a:t>
-            </a:r>
-            <a:r>
-              <a:rPr lang="en-US" sz="2400" b="0" i="0" u="none" strike="noStrike" cap="none" dirty="0" smtClean="0">
-                <a:solidFill>
-                  <a:srgbClr val="EEB211"/>
-                </a:solidFill>
-                <a:latin typeface="Calibri"/>
-                <a:ea typeface="Calibri"/>
-                <a:cs typeface="Calibri"/>
-                <a:sym typeface="Calibri"/>
-              </a:rPr>
-              <a:t> </a:t>
-            </a:r>
-            <a:r>
-              <a:rPr lang="en-US" sz="2400" b="0" i="0" u="none" strike="noStrike" cap="none" dirty="0" smtClean="0">
-                <a:solidFill>
-                  <a:srgbClr val="EEB211"/>
-                </a:solidFill>
-                <a:latin typeface="Calibri"/>
-                <a:ea typeface="Calibri"/>
-                <a:cs typeface="Calibri"/>
-                <a:sym typeface="Calibri"/>
-              </a:rPr>
-              <a:t>CHALLENGES</a:t>
-            </a:r>
-            <a:endParaRPr lang="en-US" sz="2400" b="0" i="0" u="none" strike="noStrike" cap="none" dirty="0">
-              <a:solidFill>
-                <a:srgbClr val="EEB211"/>
-              </a:solidFill>
-              <a:latin typeface="Calibri"/>
-              <a:ea typeface="Calibri"/>
-              <a:cs typeface="Calibri"/>
-              <a:sym typeface="Calibri"/>
-            </a:endParaRPr>
-          </a:p>
-        </p:txBody>
-      </p:sp>
-    </p:spTree>
-    <p:extLst>
-      <p:ext uri="{BB962C8B-B14F-4D97-AF65-F5344CB8AC3E}">
-        <p14:creationId xmlns:p14="http://schemas.microsoft.com/office/powerpoint/2010/main" val="2361553802"/>
-      </p:ext>
-    </p:extLst>
-  </p:cSld>
-  <p:clrMapOvr>
-    <a:masterClrMapping/>
-  </p:clrMapOvr>
-  <p:transition spd="slow">
-    <p:cut/>
-  </p:transition>
-  <p:timing>
-    <p:tnLst>
-      <p:par>
-        <p:cTn id="1" dur="indefinite" restart="never" nodeType="tmRoot"/>
-      </p:par>
-    </p:tnLst>
-  </p:timing>
-</p:sld>
-</file>
-
-<file path=ppt/slides/slide17.xml><?xml version="1.0" encoding="utf-8"?>
-<p:sld xmlns:a="http://schemas.openxmlformats.org/drawingml/2006/main" xmlns:r="http://schemas.openxmlformats.org/officeDocument/2006/relationships" xmlns:p="http://schemas.openxmlformats.org/presentationml/2006/main">
-  <p:cSld>
-    <p:spTree>
-      <p:nvGrpSpPr>
-        <p:cNvPr id="1" name="Shape 131"/>
-        <p:cNvGrpSpPr/>
-        <p:nvPr/>
-      </p:nvGrpSpPr>
-      <p:grpSpPr>
-        <a:xfrm>
-          <a:off x="0" y="0"/>
-          <a:ext cx="0" cy="0"/>
-          <a:chOff x="0" y="0"/>
-          <a:chExt cx="0" cy="0"/>
-        </a:xfrm>
-      </p:grpSpPr>
-      <p:sp>
-        <p:nvSpPr>
-          <p:cNvPr id="132" name="Shape 132"/>
-          <p:cNvSpPr txBox="1">
-            <a:spLocks noGrp="1"/>
-          </p:cNvSpPr>
-          <p:nvPr>
-            <p:ph type="body" idx="1"/>
-          </p:nvPr>
-        </p:nvSpPr>
-        <p:spPr>
-          <a:xfrm>
-            <a:off x="0" y="999067"/>
-            <a:ext cx="9143998" cy="5164664"/>
-          </a:xfrm>
-          <a:prstGeom prst="rect">
-            <a:avLst/>
-          </a:prstGeom>
-          <a:noFill/>
-          <a:ln>
-            <a:noFill/>
-          </a:ln>
-        </p:spPr>
-        <p:txBody>
-          <a:bodyPr lIns="274300" tIns="45700" rIns="274300" bIns="45700" anchor="t" anchorCtr="0">
-            <a:noAutofit/>
-          </a:bodyPr>
-          <a:lstStyle/>
-          <a:p>
             <a:pPr marL="342900" marR="0" lvl="0" indent="-342900" algn="l" rtl="0">
               <a:spcBef>
                 <a:spcPts val="1080"/>
@@ -22182,7 +20567,7 @@
 </p:sld>
 </file>
 
-<file path=ppt/slides/slide18.xml><?xml version="1.0" encoding="utf-8"?>
+<file path=ppt/slides/slide15.xml><?xml version="1.0" encoding="utf-8"?>
 <p:sld xmlns:a="http://schemas.openxmlformats.org/drawingml/2006/main" xmlns:r="http://schemas.openxmlformats.org/officeDocument/2006/relationships" xmlns:p="http://schemas.openxmlformats.org/presentationml/2006/main">
   <p:cSld>
     <p:spTree>
@@ -22240,7 +20625,7 @@
 </p:sld>
 </file>
 
-<file path=ppt/slides/slide19.xml><?xml version="1.0" encoding="utf-8"?>
+<file path=ppt/slides/slide16.xml><?xml version="1.0" encoding="utf-8"?>
 <p:sld xmlns:a="http://schemas.openxmlformats.org/drawingml/2006/main" xmlns:r="http://schemas.openxmlformats.org/officeDocument/2006/relationships" xmlns:p="http://schemas.openxmlformats.org/presentationml/2006/main">
   <p:cSld>
     <p:spTree>
@@ -22356,7 +20741,7 @@
         <p:spPr>
           <a:xfrm>
             <a:off x="0" y="846161"/>
-            <a:ext cx="9143998" cy="5317570"/>
+            <a:ext cx="9143998" cy="5486400"/>
           </a:xfrm>
           <a:prstGeom prst="rect">
             <a:avLst/>
@@ -22458,7 +20843,64 @@
                 <a:cs typeface="Calibri"/>
                 <a:sym typeface="Calibri"/>
               </a:rPr>
-              <a:t>Screen Prototypes/Demonstrations</a:t>
+              <a:t>Screen </a:t>
+            </a:r>
+            <a:r>
+              <a:rPr lang="en-US" sz="2400" b="0" i="0" u="none" strike="noStrike" cap="none" dirty="0" smtClean="0">
+                <a:solidFill>
+                  <a:schemeClr val="lt1"/>
+                </a:solidFill>
+                <a:latin typeface="Calibri"/>
+                <a:ea typeface="Calibri"/>
+                <a:cs typeface="Calibri"/>
+                <a:sym typeface="Calibri"/>
+              </a:rPr>
+              <a:t>Prototypes/Demonstrations</a:t>
+            </a:r>
+          </a:p>
+          <a:p>
+            <a:pPr marL="0" marR="0" lvl="0" indent="0" algn="l" rtl="0">
+              <a:spcBef>
+                <a:spcPts val="1080"/>
+              </a:spcBef>
+              <a:spcAft>
+                <a:spcPts val="0"/>
+              </a:spcAft>
+              <a:buClr>
+                <a:schemeClr val="lt1"/>
+              </a:buClr>
+              <a:buSzPct val="25000"/>
+              <a:buFont typeface="Arial"/>
+              <a:buNone/>
+            </a:pPr>
+            <a:endParaRPr lang="en-US" dirty="0"/>
+          </a:p>
+          <a:p>
+            <a:pPr marL="0" marR="0" lvl="0" indent="0" algn="l" rtl="0">
+              <a:spcBef>
+                <a:spcPts val="1080"/>
+              </a:spcBef>
+              <a:spcAft>
+                <a:spcPts val="0"/>
+              </a:spcAft>
+              <a:buClr>
+                <a:schemeClr val="lt1"/>
+              </a:buClr>
+              <a:buSzPct val="25000"/>
+              <a:buFont typeface="Arial"/>
+              <a:buNone/>
+            </a:pPr>
+            <a:r>
+              <a:rPr lang="en-US" sz="2400" b="0" i="0" u="none" strike="noStrike" cap="none" dirty="0" smtClean="0">
+                <a:solidFill>
+                  <a:schemeClr val="lt1"/>
+                </a:solidFill>
+                <a:latin typeface="Calibri"/>
+                <a:ea typeface="Calibri"/>
+                <a:cs typeface="Calibri"/>
+                <a:sym typeface="Calibri"/>
+              </a:rPr>
+              <a:t>Product Deployment</a:t>
             </a:r>
             <a:endParaRPr lang="en-US" sz="2400" b="0" i="0" u="none" strike="noStrike" cap="none" dirty="0">
               <a:solidFill>
@@ -22849,7 +21291,23 @@
                   <a:schemeClr val="bg1"/>
                 </a:solidFill>
               </a:rPr>
-              <a:t>These are very exciting times for us here at SafeTravels. Our product is starting to take its final form and things are actually working. We made immense progress in finalizing our UI, user management, user registration and notification process, data extraction from our online resources and its analysis and utilization. Our current major challenge is FHIR integration for our user vaccinations feature. This effort is lead by Forrest and John. </a:t>
+              <a:t>These are very exciting times for us here at SafeTravels. Our product is starting to take its final form and things are actually working. We made immense progress in finalizing our UI, user management, user registration and notification process, data extraction from our online resources and its analysis and utilization. Our current major challenge is FHIR integration for our user vaccinations feature. This effort is </a:t>
+            </a:r>
+            <a:r>
+              <a:rPr lang="en-US" dirty="0" smtClean="0">
+                <a:solidFill>
+                  <a:schemeClr val="bg1"/>
+                </a:solidFill>
+              </a:rPr>
+              <a:t>led </a:t>
+            </a:r>
+            <a:r>
+              <a:rPr lang="en-US" dirty="0">
+                <a:solidFill>
+                  <a:schemeClr val="bg1"/>
+                </a:solidFill>
+              </a:rPr>
+              <a:t>by Forrest and John. </a:t>
             </a:r>
           </a:p>
           <a:p>
@@ -22870,11 +21328,6 @@
               </a:rPr>
               <a:t>Brace yourselves. SafeTravels is coming. </a:t>
             </a:r>
-            <a:endParaRPr lang="en-US" dirty="0">
-              <a:solidFill>
-                <a:schemeClr val="bg1"/>
-              </a:solidFill>
-            </a:endParaRPr>
           </a:p>
         </p:txBody>
       </p:sp>
@@ -23330,19 +21783,7 @@
                 <a:cs typeface="Calibri"/>
                 <a:sym typeface="Calibri"/>
               </a:rPr>
-              <a:t>PROJECT </a:t>
-            </a:r>
-            <a:r>
-              <a:rPr lang="en-US" sz="2400" b="0" i="0" u="none" strike="noStrike" cap="none" dirty="0" smtClean="0">
-                <a:solidFill>
-                  <a:srgbClr val="EEB211"/>
-                </a:solidFill>
-                <a:latin typeface="Calibri"/>
-                <a:ea typeface="Calibri"/>
-                <a:cs typeface="Calibri"/>
-                <a:sym typeface="Calibri"/>
-              </a:rPr>
-              <a:t>UPDATE - FEATURES</a:t>
+              <a:t>PROJECT UPDATE - FEATURES</a:t>
             </a:r>
             <a:endParaRPr lang="en-US" sz="2400" b="0" i="0" u="none" strike="noStrike" cap="none" dirty="0">
               <a:solidFill>
@@ -23588,19 +22029,7 @@
                 <a:cs typeface="Calibri"/>
                 <a:sym typeface="Calibri"/>
               </a:rPr>
-              <a:t>      GANTT </a:t>
-            </a:r>
-            <a:r>
-              <a:rPr lang="en-US" sz="2400" b="0" i="0" u="none" strike="noStrike" cap="none" dirty="0" smtClean="0">
-                <a:solidFill>
-                  <a:srgbClr val="EEB211"/>
-                </a:solidFill>
-                <a:latin typeface="Calibri"/>
-                <a:ea typeface="Calibri"/>
-                <a:cs typeface="Calibri"/>
-                <a:sym typeface="Calibri"/>
-              </a:rPr>
-              <a:t>CHART</a:t>
+              <a:t>      GANTT CHART</a:t>
             </a:r>
             <a:endParaRPr lang="en-US" sz="2400" b="0" i="0" u="none" strike="noStrike" cap="none" dirty="0">
               <a:solidFill>
@@ -27522,14 +25951,19 @@
             </a:endParaRPr>
           </a:p>
           <a:p>
-            <a:pPr lvl="0">
+            <a:pPr marL="0" marR="0" lvl="0" indent="0" algn="l" rtl="0">
               <a:spcBef>
                 <a:spcPts val="1080"/>
               </a:spcBef>
               <a:spcAft>
                 <a:spcPts val="0"/>
               </a:spcAft>
+              <a:buClr>
+                <a:schemeClr val="lt1"/>
+              </a:buClr>
               <a:buSzPct val="25000"/>
+              <a:buFont typeface="Arial"/>
+              <a:buNone/>
             </a:pPr>
             <a:r>
               <a:rPr lang="en-US" sz="1800" b="0" i="0" u="none" strike="noStrike" cap="none" dirty="0" smtClean="0">
@@ -27541,35 +25975,32 @@
                 <a:cs typeface="Calibri"/>
                 <a:sym typeface="Calibri"/>
               </a:rPr>
-              <a:t>Go </a:t>
+              <a:t>The </a:t>
             </a:r>
             <a:r>
-              <a:rPr lang="en-US" sz="1800" dirty="0"/>
-              <a:t>the website: </a:t>
+              <a:rPr lang="en-US" sz="1800" b="0" i="0" u="none" strike="noStrike" cap="none" dirty="0" smtClean="0">
+                <a:solidFill>
+                  <a:schemeClr val="lt1"/>
+                </a:solidFill>
+                <a:latin typeface="Calibri"/>
+                <a:ea typeface="Calibri"/>
+                <a:cs typeface="Calibri"/>
+                <a:sym typeface="Calibri"/>
+              </a:rPr>
+              <a:t>following screen shows </a:t>
             </a:r>
             <a:r>
-              <a:rPr lang="en-US" sz="1800" dirty="0">
-                <a:hlinkClick r:id="rId3"/>
+              <a:rPr lang="en-US" sz="1800" b="0" i="0" u="none" strike="noStrike" cap="none" dirty="0" smtClean="0">
+                <a:solidFill>
+                  <a:schemeClr val="lt1"/>
+                </a:solidFill>
+                <a:latin typeface="Calibri"/>
+                <a:ea typeface="Calibri"/>
+                <a:cs typeface="Calibri"/>
+                <a:sym typeface="Calibri"/>
               </a:rPr>
-              <a:t>https://safe-travels-app.herokuapp.com/signup</a:t>
+              <a:t>up on when user clicks our website. </a:t>
             </a:r>
-            <a:endParaRPr lang="en-US" sz="1800" dirty="0"/>
-          </a:p>
-          <a:p>
-            <a:pPr marL="0" marR="0" lvl="0" indent="0" algn="l" rtl="0">
-              <a:spcBef>
-                <a:spcPts val="1080"/>
-              </a:spcBef>
-              <a:spcAft>
-                <a:spcPts val="0"/>
-              </a:spcAft>
-              <a:buClr>
-                <a:schemeClr val="lt1"/>
-              </a:buClr>
-              <a:buSzPct val="25000"/>
-              <a:buFont typeface="Arial"/>
-              <a:buNone/>
-            </a:pPr>
             <a:r>
               <a:rPr lang="en-US" sz="1800" b="0" i="0" u="none" strike="noStrike" cap="none" dirty="0" smtClean="0">
                 <a:solidFill>
@@ -27580,7 +26011,7 @@
                 <a:cs typeface="Calibri"/>
                 <a:sym typeface="Calibri"/>
               </a:rPr>
-              <a:t>The following screen shows up. A new user can either register on the site, or existing users can login</a:t>
+              <a:t>A new user can either register on the site, or existing users can login</a:t>
             </a:r>
           </a:p>
         </p:txBody>
@@ -27670,7 +26101,7 @@
           <p:nvPr/>
         </p:nvPicPr>
         <p:blipFill>
-          <a:blip r:embed="rId4"/>
+          <a:blip r:embed="rId3"/>
           <a:stretch>
             <a:fillRect/>
           </a:stretch>
@@ -27932,19 +26363,14 @@
             </a:endParaRPr>
           </a:p>
           <a:p>
-            <a:pPr marL="0" marR="0" lvl="0" indent="0" algn="l" rtl="0">
+            <a:pPr lvl="0">
               <a:spcBef>
                 <a:spcPts val="1080"/>
               </a:spcBef>
               <a:spcAft>
                 <a:spcPts val="0"/>
               </a:spcAft>
-              <a:buClr>
-                <a:schemeClr val="lt1"/>
-              </a:buClr>
               <a:buSzPct val="25000"/>
-              <a:buFont typeface="Arial"/>
-              <a:buNone/>
             </a:pPr>
             <a:r>
               <a:rPr lang="en-US" sz="1800" b="0" i="0" u="none" strike="noStrike" cap="none" dirty="0" smtClean="0">
@@ -27956,11 +26382,7 @@
                 <a:cs typeface="Calibri"/>
                 <a:sym typeface="Calibri"/>
               </a:rPr>
-              <a:t>Assuming an existing user ( </a:t>
-            </a:r>
-            <a:r>
-              <a:rPr lang="en-US" sz="1800" dirty="0" smtClean="0"/>
-              <a:t>someone already signed up), t</a:t>
+              <a:t>The application allows a user to </a:t>
             </a:r>
             <a:r>
               <a:rPr lang="en-US" sz="1800" b="0" i="0" u="none" strike="noStrike" cap="none" dirty="0" smtClean="0">
@@ -27972,21 +26394,9 @@
                 <a:cs typeface="Calibri"/>
                 <a:sym typeface="Calibri"/>
               </a:rPr>
-              <a:t>he following screen shows up. Ente</a:t>
+              <a:t>select single or multiple countries that he/she is travelling to. There’s also option to receive email notification about health hazards. </a:t>
             </a:r>
-            <a:r>
-              <a:rPr lang="en-US" sz="1800" dirty="0" smtClean="0"/>
-              <a:t>r the email address and password</a:t>
-            </a:r>
-            <a:endParaRPr lang="en-US" sz="1800" b="0" i="0" u="none" strike="noStrike" cap="none" dirty="0" smtClean="0">
-              <a:solidFill>
-                <a:schemeClr val="lt1"/>
-              </a:solidFill>
-              <a:latin typeface="Calibri"/>
-              <a:ea typeface="Calibri"/>
-              <a:cs typeface="Calibri"/>
-              <a:sym typeface="Calibri"/>
-            </a:endParaRPr>
+            <a:endParaRPr lang="en-US" sz="1800" dirty="0"/>
           </a:p>
         </p:txBody>
       </p:sp>
@@ -28082,8 +26492,8 @@
         </p:blipFill>
         <p:spPr>
           <a:xfrm>
-            <a:off x="979867" y="694544"/>
-            <a:ext cx="6308038" cy="4143774"/>
+            <a:off x="636683" y="1132764"/>
+            <a:ext cx="7611552" cy="3191941"/>
           </a:xfrm>
           <a:prstGeom prst="rect">
             <a:avLst/>
@@ -28093,7 +26503,7 @@
     </p:spTree>
     <p:extLst>
       <p:ext uri="{BB962C8B-B14F-4D97-AF65-F5344CB8AC3E}">
-        <p14:creationId xmlns:p14="http://schemas.microsoft.com/office/powerpoint/2010/main" val="866745911"/>
+        <p14:creationId xmlns:p14="http://schemas.microsoft.com/office/powerpoint/2010/main" val="2328332127"/>
       </p:ext>
     </p:extLst>
   </p:cSld>
@@ -28270,21 +26680,52 @@
             </a:endParaRPr>
           </a:p>
           <a:p>
-            <a:pPr marL="0" marR="0" lvl="0" indent="0" algn="l" rtl="0">
+            <a:pPr lvl="0">
               <a:spcBef>
                 <a:spcPts val="1080"/>
               </a:spcBef>
               <a:spcAft>
                 <a:spcPts val="0"/>
               </a:spcAft>
-              <a:buClr>
-                <a:schemeClr val="lt1"/>
-              </a:buClr>
               <a:buSzPct val="25000"/>
-              <a:buFont typeface="Arial"/>
-              <a:buNone/>
             </a:pPr>
-            <a:endParaRPr lang="en-US" sz="2400" b="0" i="0" u="none" strike="noStrike" cap="none" dirty="0" smtClean="0">
+            <a:r>
+              <a:rPr lang="en-US" sz="1800" b="0" i="0" u="none" strike="noStrike" cap="none" dirty="0" smtClean="0">
+                <a:solidFill>
+                  <a:schemeClr val="lt1"/>
+                </a:solidFill>
+                <a:latin typeface="Calibri"/>
+                <a:ea typeface="Calibri"/>
+                <a:cs typeface="Calibri"/>
+                <a:sym typeface="Calibri"/>
+              </a:rPr>
+              <a:t>Our App provides the </a:t>
+            </a:r>
+            <a:r>
+              <a:rPr lang="en-US" sz="1800" b="0" i="0" u="none" strike="noStrike" cap="none" dirty="0" smtClean="0">
+                <a:solidFill>
+                  <a:schemeClr val="lt1"/>
+                </a:solidFill>
+                <a:latin typeface="Calibri"/>
+                <a:ea typeface="Calibri"/>
+                <a:cs typeface="Calibri"/>
+                <a:sym typeface="Calibri"/>
+              </a:rPr>
+              <a:t>following </a:t>
+            </a:r>
+            <a:r>
+              <a:rPr lang="en-US" sz="1800" b="0" i="0" u="none" strike="noStrike" cap="none" dirty="0" smtClean="0">
+                <a:solidFill>
+                  <a:schemeClr val="lt1"/>
+                </a:solidFill>
+                <a:latin typeface="Calibri"/>
+                <a:ea typeface="Calibri"/>
+                <a:cs typeface="Calibri"/>
+                <a:sym typeface="Calibri"/>
+              </a:rPr>
+              <a:t>dashboard for Trip Information. </a:t>
+            </a:r>
+            <a:endParaRPr lang="en-US" sz="1800" b="0" i="0" u="none" strike="noStrike" cap="none" dirty="0" smtClean="0">
               <a:solidFill>
                 <a:schemeClr val="lt1"/>
               </a:solidFill>
@@ -28295,49 +26736,45 @@
             </a:endParaRPr>
           </a:p>
           <a:p>
-            <a:pPr marL="0" marR="0" lvl="0" indent="0" algn="l" rtl="0">
+            <a:pPr marL="285750" lvl="0" indent="-285750">
               <a:spcBef>
                 <a:spcPts val="1080"/>
               </a:spcBef>
               <a:spcAft>
                 <a:spcPts val="0"/>
               </a:spcAft>
-              <a:buClr>
-                <a:schemeClr val="lt1"/>
-              </a:buClr>
               <a:buSzPct val="25000"/>
-              <a:buFont typeface="Arial"/>
-              <a:buNone/>
+              <a:buFont typeface="Wingdings" panose="05000000000000000000" pitchFamily="2" charset="2"/>
+              <a:buChar char="v"/>
             </a:pPr>
-            <a:endParaRPr lang="en-US" dirty="0"/>
+            <a:r>
+              <a:rPr lang="en-US" sz="1800" dirty="0" smtClean="0"/>
+              <a:t>Packing </a:t>
+            </a:r>
+            <a:r>
+              <a:rPr lang="en-US" sz="1800" dirty="0"/>
+              <a:t>Checklist  - List of items to pack for the trip</a:t>
+            </a:r>
           </a:p>
           <a:p>
-            <a:pPr marL="0" marR="0" lvl="0" indent="0" algn="l" rtl="0">
+            <a:pPr marL="285750" lvl="0" indent="-285750">
               <a:spcBef>
                 <a:spcPts val="1080"/>
               </a:spcBef>
               <a:spcAft>
                 <a:spcPts val="0"/>
               </a:spcAft>
-              <a:buClr>
-                <a:schemeClr val="lt1"/>
-              </a:buClr>
               <a:buSzPct val="25000"/>
-              <a:buFont typeface="Arial"/>
-              <a:buNone/>
+              <a:buFont typeface="Wingdings" panose="05000000000000000000" pitchFamily="2" charset="2"/>
+              <a:buChar char="v"/>
             </a:pPr>
-            <a:endParaRPr lang="en-US" sz="2400" b="0" i="0" u="none" strike="noStrike" cap="none" dirty="0" smtClean="0">
-              <a:solidFill>
-                <a:schemeClr val="lt1"/>
-              </a:solidFill>
-              <a:latin typeface="Calibri"/>
-              <a:ea typeface="Calibri"/>
-              <a:cs typeface="Calibri"/>
-              <a:sym typeface="Calibri"/>
-            </a:endParaRPr>
+            <a:r>
+              <a:rPr lang="en-US" sz="1800" dirty="0"/>
+              <a:t>Vaccine Checklist – List of vaccines necessary or required for this trip</a:t>
+            </a:r>
           </a:p>
           <a:p>
-            <a:pPr lvl="0">
+            <a:pPr marL="285750" lvl="0" indent="-285750">
               <a:spcBef>
                 <a:spcPts val="1080"/>
               </a:spcBef>
@@ -28345,18 +26782,45 @@
                 <a:spcPts val="0"/>
               </a:spcAft>
               <a:buSzPct val="25000"/>
+              <a:buFont typeface="Wingdings" panose="05000000000000000000" pitchFamily="2" charset="2"/>
+              <a:buChar char="v"/>
             </a:pPr>
             <a:r>
-              <a:rPr lang="en-US" sz="1800" b="0" i="0" u="none" strike="noStrike" cap="none" dirty="0" smtClean="0">
-                <a:solidFill>
-                  <a:schemeClr val="lt1"/>
-                </a:solidFill>
-                <a:latin typeface="Calibri"/>
-                <a:ea typeface="Calibri"/>
-                <a:cs typeface="Calibri"/>
-                <a:sym typeface="Calibri"/>
-              </a:rPr>
-              <a:t>After signing in, the “Plan Trip” screen shows up. The user can select single or multiple countries that he/she is travelling to. There’s also option to receive email notification about health hazards. Then click on the Plan My Trip Button</a:t>
+              <a:rPr lang="en-US" sz="1800" dirty="0" smtClean="0"/>
+              <a:t>Alerts </a:t>
+            </a:r>
+            <a:r>
+              <a:rPr lang="en-US" sz="1800" dirty="0"/>
+              <a:t>– </a:t>
+            </a:r>
+            <a:r>
+              <a:rPr lang="en-US" sz="1800" dirty="0" smtClean="0"/>
+              <a:t>Provides list of travel alerts </a:t>
+            </a:r>
+            <a:r>
+              <a:rPr lang="en-US" sz="1800" dirty="0"/>
+              <a:t>for this trip</a:t>
+            </a:r>
+          </a:p>
+          <a:p>
+            <a:pPr marL="285750" lvl="0" indent="-285750">
+              <a:spcBef>
+                <a:spcPts val="1080"/>
+              </a:spcBef>
+              <a:spcAft>
+                <a:spcPts val="0"/>
+              </a:spcAft>
+              <a:buSzPct val="25000"/>
+              <a:buFont typeface="Wingdings" panose="05000000000000000000" pitchFamily="2" charset="2"/>
+              <a:buChar char="v"/>
+            </a:pPr>
+            <a:r>
+              <a:rPr lang="en-US" sz="1800" dirty="0"/>
+              <a:t>Profile – View/Edit the user </a:t>
+            </a:r>
+            <a:r>
+              <a:rPr lang="en-US" sz="1800" dirty="0" smtClean="0"/>
+              <a:t>profile</a:t>
             </a:r>
             <a:endParaRPr lang="en-US" sz="1800" dirty="0"/>
           </a:p>
@@ -28454,8 +26918,8 @@
         </p:blipFill>
         <p:spPr>
           <a:xfrm>
-            <a:off x="636683" y="1132764"/>
-            <a:ext cx="7611552" cy="3191941"/>
+            <a:off x="573667" y="868987"/>
+            <a:ext cx="7996664" cy="2496820"/>
           </a:xfrm>
           <a:prstGeom prst="rect">
             <a:avLst/>
@@ -28465,7 +26929,7 @@
     </p:spTree>
     <p:extLst>
       <p:ext uri="{BB962C8B-B14F-4D97-AF65-F5344CB8AC3E}">
-        <p14:creationId xmlns:p14="http://schemas.microsoft.com/office/powerpoint/2010/main" val="2328332127"/>
+        <p14:creationId xmlns:p14="http://schemas.microsoft.com/office/powerpoint/2010/main" val="896586723"/>
       </p:ext>
     </p:extLst>
   </p:cSld>
@@ -28642,14 +27106,86 @@
             </a:endParaRPr>
           </a:p>
           <a:p>
-            <a:pPr lvl="0">
+            <a:pPr marL="0" marR="0" lvl="0" indent="0" algn="l" rtl="0">
               <a:spcBef>
                 <a:spcPts val="1080"/>
               </a:spcBef>
               <a:spcAft>
                 <a:spcPts val="0"/>
               </a:spcAft>
+              <a:buClr>
+                <a:schemeClr val="lt1"/>
+              </a:buClr>
               <a:buSzPct val="25000"/>
+              <a:buFont typeface="Arial"/>
+              <a:buNone/>
+            </a:pPr>
+            <a:endParaRPr lang="en-US" sz="2400" b="0" i="0" u="none" strike="noStrike" cap="none" dirty="0" smtClean="0">
+              <a:solidFill>
+                <a:schemeClr val="lt1"/>
+              </a:solidFill>
+              <a:latin typeface="Calibri"/>
+              <a:ea typeface="Calibri"/>
+              <a:cs typeface="Calibri"/>
+              <a:sym typeface="Calibri"/>
+            </a:endParaRPr>
+          </a:p>
+          <a:p>
+            <a:pPr marL="0" marR="0" lvl="0" indent="0" algn="l" rtl="0">
+              <a:spcBef>
+                <a:spcPts val="1080"/>
+              </a:spcBef>
+              <a:spcAft>
+                <a:spcPts val="0"/>
+              </a:spcAft>
+              <a:buClr>
+                <a:schemeClr val="lt1"/>
+              </a:buClr>
+              <a:buSzPct val="25000"/>
+              <a:buFont typeface="Arial"/>
+              <a:buNone/>
+            </a:pPr>
+            <a:endParaRPr lang="en-US" dirty="0"/>
+          </a:p>
+          <a:p>
+            <a:pPr marL="0" marR="0" lvl="0" indent="0" algn="l" rtl="0">
+              <a:spcBef>
+                <a:spcPts val="1080"/>
+              </a:spcBef>
+              <a:spcAft>
+                <a:spcPts val="0"/>
+              </a:spcAft>
+              <a:buClr>
+                <a:schemeClr val="lt1"/>
+              </a:buClr>
+              <a:buSzPct val="25000"/>
+              <a:buFont typeface="Arial"/>
+              <a:buNone/>
+            </a:pPr>
+            <a:endParaRPr lang="en-US" sz="2400" b="0" i="0" u="none" strike="noStrike" cap="none" dirty="0" smtClean="0">
+              <a:solidFill>
+                <a:schemeClr val="lt1"/>
+              </a:solidFill>
+              <a:latin typeface="Calibri"/>
+              <a:ea typeface="Calibri"/>
+              <a:cs typeface="Calibri"/>
+              <a:sym typeface="Calibri"/>
+            </a:endParaRPr>
+          </a:p>
+          <a:p>
+            <a:pPr marL="0" marR="0" lvl="0" indent="0" algn="l" rtl="0">
+              <a:spcBef>
+                <a:spcPts val="1080"/>
+              </a:spcBef>
+              <a:spcAft>
+                <a:spcPts val="0"/>
+              </a:spcAft>
+              <a:buClr>
+                <a:schemeClr val="lt1"/>
+              </a:buClr>
+              <a:buSzPct val="25000"/>
+              <a:buFont typeface="Arial"/>
+              <a:buNone/>
             </a:pPr>
             <a:r>
               <a:rPr lang="en-US" sz="1800" b="0" i="0" u="none" strike="noStrike" cap="none" dirty="0" smtClean="0">
@@ -28661,96 +27197,20 @@
                 <a:cs typeface="Calibri"/>
                 <a:sym typeface="Calibri"/>
               </a:rPr>
-              <a:t>The following screen shows up. </a:t>
-            </a:r>
-          </a:p>
-          <a:p>
-            <a:pPr marL="285750" lvl="0" indent="-285750">
-              <a:spcBef>
-                <a:spcPts val="1080"/>
-              </a:spcBef>
-              <a:spcAft>
-                <a:spcPts val="0"/>
-              </a:spcAft>
-              <a:buSzPct val="25000"/>
-              <a:buFont typeface="Wingdings" panose="05000000000000000000" pitchFamily="2" charset="2"/>
-              <a:buChar char="v"/>
-            </a:pPr>
-            <a:r>
-              <a:rPr lang="en-US" sz="1800" dirty="0" smtClean="0"/>
-              <a:t>Packing </a:t>
+              <a:t>We also provide the functionality for a user  to edit </a:t>
             </a:r>
             <a:r>
-              <a:rPr lang="en-US" sz="1800" dirty="0"/>
-              <a:t>Checklist  - List of items to pack for the trip</a:t>
+              <a:rPr lang="en-US" sz="1800" b="0" i="0" u="none" strike="noStrike" cap="none" dirty="0" smtClean="0">
+                <a:solidFill>
+                  <a:schemeClr val="lt1"/>
+                </a:solidFill>
+                <a:latin typeface="Calibri"/>
+                <a:ea typeface="Calibri"/>
+                <a:cs typeface="Calibri"/>
+                <a:sym typeface="Calibri"/>
+              </a:rPr>
+              <a:t>her user profile info, including Name, Sex, </a:t>
             </a:r>
-          </a:p>
-          <a:p>
-            <a:pPr marL="285750" lvl="0" indent="-285750">
-              <a:spcBef>
-                <a:spcPts val="1080"/>
-              </a:spcBef>
-              <a:spcAft>
-                <a:spcPts val="0"/>
-              </a:spcAft>
-              <a:buSzPct val="25000"/>
-              <a:buFont typeface="Wingdings" panose="05000000000000000000" pitchFamily="2" charset="2"/>
-              <a:buChar char="v"/>
-            </a:pPr>
-            <a:r>
-              <a:rPr lang="en-US" sz="1800" dirty="0"/>
-              <a:t>Vaccine Checklist – List of vaccines necessary or required for this trip</a:t>
-            </a:r>
-          </a:p>
-          <a:p>
-            <a:pPr marL="285750" lvl="0" indent="-285750">
-              <a:spcBef>
-                <a:spcPts val="1080"/>
-              </a:spcBef>
-              <a:spcAft>
-                <a:spcPts val="0"/>
-              </a:spcAft>
-              <a:buSzPct val="25000"/>
-              <a:buFont typeface="Wingdings" panose="05000000000000000000" pitchFamily="2" charset="2"/>
-              <a:buChar char="v"/>
-            </a:pPr>
-            <a:r>
-              <a:rPr lang="en-US" sz="1800" dirty="0"/>
-              <a:t>Notifications – Set travel notifications for this trip</a:t>
-            </a:r>
-          </a:p>
-          <a:p>
-            <a:pPr marL="285750" lvl="0" indent="-285750">
-              <a:spcBef>
-                <a:spcPts val="1080"/>
-              </a:spcBef>
-              <a:spcAft>
-                <a:spcPts val="0"/>
-              </a:spcAft>
-              <a:buSzPct val="25000"/>
-              <a:buFont typeface="Wingdings" panose="05000000000000000000" pitchFamily="2" charset="2"/>
-              <a:buChar char="v"/>
-            </a:pPr>
-            <a:r>
-              <a:rPr lang="en-US" sz="1800" dirty="0"/>
-              <a:t>Profile – View/Edit the user profile</a:t>
-            </a:r>
-          </a:p>
-          <a:p>
-            <a:pPr marL="0" marR="0" lvl="0" indent="0" algn="l" rtl="0">
-              <a:spcBef>
-                <a:spcPts val="1080"/>
-              </a:spcBef>
-              <a:spcAft>
-                <a:spcPts val="0"/>
-              </a:spcAft>
-              <a:buClr>
-                <a:schemeClr val="lt1"/>
-              </a:buClr>
-              <a:buSzPct val="25000"/>
-              <a:buFont typeface="Arial"/>
-              <a:buNone/>
-            </a:pPr>
             <a:r>
               <a:rPr lang="en-US" sz="1800" b="0" i="0" u="none" strike="noStrike" cap="none" dirty="0" smtClean="0">
                 <a:solidFill>
@@ -28761,8 +27221,17 @@
                 <a:cs typeface="Calibri"/>
                 <a:sym typeface="Calibri"/>
               </a:rPr>
-              <a:t> The user can click on any of the following options. First, lets click on Packing Checklist option. </a:t>
+              <a:t>password…etc.</a:t>
             </a:r>
+            <a:endParaRPr sz="1800" b="0" i="0" u="none" strike="noStrike" cap="none" dirty="0">
+              <a:solidFill>
+                <a:schemeClr val="lt1"/>
+              </a:solidFill>
+              <a:latin typeface="Calibri"/>
+              <a:ea typeface="Calibri"/>
+              <a:cs typeface="Calibri"/>
+              <a:sym typeface="Calibri"/>
+            </a:endParaRPr>
           </a:p>
         </p:txBody>
       </p:sp>
@@ -28844,7 +27313,7 @@
       </p:sp>
       <p:pic>
         <p:nvPicPr>
-          <p:cNvPr id="3" name="Picture 2"/>
+          <p:cNvPr id="2" name="Picture 1"/>
           <p:cNvPicPr>
             <a:picLocks noChangeAspect="1"/>
           </p:cNvPicPr>
@@ -28858,8 +27327,8 @@
         </p:blipFill>
         <p:spPr>
           <a:xfrm>
-            <a:off x="573667" y="868987"/>
-            <a:ext cx="7996664" cy="2496820"/>
+            <a:off x="1460595" y="999067"/>
+            <a:ext cx="5676900" cy="3171825"/>
           </a:xfrm>
           <a:prstGeom prst="rect">
             <a:avLst/>
@@ -28869,7 +27338,7 @@
     </p:spTree>
     <p:extLst>
       <p:ext uri="{BB962C8B-B14F-4D97-AF65-F5344CB8AC3E}">
-        <p14:creationId xmlns:p14="http://schemas.microsoft.com/office/powerpoint/2010/main" val="896586723"/>
+        <p14:creationId xmlns:p14="http://schemas.microsoft.com/office/powerpoint/2010/main" val="126597179"/>
       </p:ext>
     </p:extLst>
   </p:cSld>

</xml_diff>